<commit_message>
Changed theme of presentation's background, downloaded new version to match.
</commit_message>
<xml_diff>
--- a/presentation/To-Do List Presentation.pptx
+++ b/presentation/To-Do List Presentation.pptx
@@ -23,15 +23,13 @@
   <p:notesSz cx="6858000" cy="9144000"/>
   <p:embeddedFontLst>
     <p:embeddedFont>
-      <p:font typeface="Proxima Nova"/>
+      <p:font typeface="Average"/>
       <p:regular r:id="rId15"/>
-      <p:bold r:id="rId16"/>
-      <p:italic r:id="rId17"/>
-      <p:boldItalic r:id="rId18"/>
     </p:embeddedFont>
     <p:embeddedFont>
-      <p:font typeface="Alfa Slab One"/>
-      <p:regular r:id="rId19"/>
+      <p:font typeface="Oswald"/>
+      <p:regular r:id="rId16"/>
+      <p:bold r:id="rId17"/>
     </p:embeddedFont>
   </p:embeddedFontLst>
   <p:defaultTextStyle>
@@ -393,7 +391,7 @@
   <p:cSld>
     <p:spTree>
       <p:nvGrpSpPr>
-        <p:cNvPr id="52" name="Shape 52"/>
+        <p:cNvPr id="55" name="Shape 55"/>
         <p:cNvGrpSpPr/>
         <p:nvPr/>
       </p:nvGrpSpPr>
@@ -407,7 +405,7 @@
       </p:grpSpPr>
       <p:sp>
         <p:nvSpPr>
-          <p:cNvPr id="53" name="Shape 53"/>
+          <p:cNvPr id="56" name="Shape 56"/>
           <p:cNvSpPr/>
           <p:nvPr>
             <p:ph idx="2" type="sldImg"/>
@@ -441,7 +439,7 @@
       </p:sp>
       <p:sp>
         <p:nvSpPr>
-          <p:cNvPr id="54" name="Shape 54"/>
+          <p:cNvPr id="57" name="Shape 57"/>
           <p:cNvSpPr txBox="1"/>
           <p:nvPr>
             <p:ph idx="1" type="body"/>
@@ -488,7 +486,7 @@
   <p:cSld>
     <p:spTree>
       <p:nvGrpSpPr>
-        <p:cNvPr id="110" name="Shape 110"/>
+        <p:cNvPr id="113" name="Shape 113"/>
         <p:cNvGrpSpPr/>
         <p:nvPr/>
       </p:nvGrpSpPr>
@@ -502,7 +500,7 @@
       </p:grpSpPr>
       <p:sp>
         <p:nvSpPr>
-          <p:cNvPr id="111" name="Shape 111"/>
+          <p:cNvPr id="114" name="Shape 114"/>
           <p:cNvSpPr/>
           <p:nvPr>
             <p:ph idx="2" type="sldImg"/>
@@ -536,7 +534,7 @@
       </p:sp>
       <p:sp>
         <p:nvSpPr>
-          <p:cNvPr id="112" name="Shape 112"/>
+          <p:cNvPr id="115" name="Shape 115"/>
           <p:cNvSpPr txBox="1"/>
           <p:nvPr>
             <p:ph idx="1" type="body"/>
@@ -583,7 +581,7 @@
   <p:cSld>
     <p:spTree>
       <p:nvGrpSpPr>
-        <p:cNvPr id="58" name="Shape 58"/>
+        <p:cNvPr id="61" name="Shape 61"/>
         <p:cNvGrpSpPr/>
         <p:nvPr/>
       </p:nvGrpSpPr>
@@ -597,7 +595,7 @@
       </p:grpSpPr>
       <p:sp>
         <p:nvSpPr>
-          <p:cNvPr id="59" name="Shape 59"/>
+          <p:cNvPr id="62" name="Shape 62"/>
           <p:cNvSpPr/>
           <p:nvPr>
             <p:ph idx="2" type="sldImg"/>
@@ -631,7 +629,7 @@
       </p:sp>
       <p:sp>
         <p:nvSpPr>
-          <p:cNvPr id="60" name="Shape 60"/>
+          <p:cNvPr id="63" name="Shape 63"/>
           <p:cNvSpPr txBox="1"/>
           <p:nvPr>
             <p:ph idx="1" type="body"/>
@@ -678,7 +676,7 @@
   <p:cSld>
     <p:spTree>
       <p:nvGrpSpPr>
-        <p:cNvPr id="64" name="Shape 64"/>
+        <p:cNvPr id="67" name="Shape 67"/>
         <p:cNvGrpSpPr/>
         <p:nvPr/>
       </p:nvGrpSpPr>
@@ -692,7 +690,7 @@
       </p:grpSpPr>
       <p:sp>
         <p:nvSpPr>
-          <p:cNvPr id="65" name="Shape 65"/>
+          <p:cNvPr id="68" name="Shape 68"/>
           <p:cNvSpPr/>
           <p:nvPr>
             <p:ph idx="2" type="sldImg"/>
@@ -726,7 +724,7 @@
       </p:sp>
       <p:sp>
         <p:nvSpPr>
-          <p:cNvPr id="66" name="Shape 66"/>
+          <p:cNvPr id="69" name="Shape 69"/>
           <p:cNvSpPr txBox="1"/>
           <p:nvPr>
             <p:ph idx="1" type="body"/>
@@ -773,7 +771,7 @@
   <p:cSld>
     <p:spTree>
       <p:nvGrpSpPr>
-        <p:cNvPr id="70" name="Shape 70"/>
+        <p:cNvPr id="73" name="Shape 73"/>
         <p:cNvGrpSpPr/>
         <p:nvPr/>
       </p:nvGrpSpPr>
@@ -787,7 +785,7 @@
       </p:grpSpPr>
       <p:sp>
         <p:nvSpPr>
-          <p:cNvPr id="71" name="Shape 71"/>
+          <p:cNvPr id="74" name="Shape 74"/>
           <p:cNvSpPr/>
           <p:nvPr>
             <p:ph idx="2" type="sldImg"/>
@@ -821,7 +819,7 @@
       </p:sp>
       <p:sp>
         <p:nvSpPr>
-          <p:cNvPr id="72" name="Shape 72"/>
+          <p:cNvPr id="75" name="Shape 75"/>
           <p:cNvSpPr txBox="1"/>
           <p:nvPr>
             <p:ph idx="1" type="body"/>
@@ -868,7 +866,7 @@
   <p:cSld>
     <p:spTree>
       <p:nvGrpSpPr>
-        <p:cNvPr id="76" name="Shape 76"/>
+        <p:cNvPr id="79" name="Shape 79"/>
         <p:cNvGrpSpPr/>
         <p:nvPr/>
       </p:nvGrpSpPr>
@@ -882,7 +880,7 @@
       </p:grpSpPr>
       <p:sp>
         <p:nvSpPr>
-          <p:cNvPr id="77" name="Shape 77"/>
+          <p:cNvPr id="80" name="Shape 80"/>
           <p:cNvSpPr/>
           <p:nvPr>
             <p:ph idx="2" type="sldImg"/>
@@ -916,7 +914,7 @@
       </p:sp>
       <p:sp>
         <p:nvSpPr>
-          <p:cNvPr id="78" name="Shape 78"/>
+          <p:cNvPr id="81" name="Shape 81"/>
           <p:cNvSpPr txBox="1"/>
           <p:nvPr>
             <p:ph idx="1" type="body"/>
@@ -963,7 +961,7 @@
   <p:cSld>
     <p:spTree>
       <p:nvGrpSpPr>
-        <p:cNvPr id="82" name="Shape 82"/>
+        <p:cNvPr id="85" name="Shape 85"/>
         <p:cNvGrpSpPr/>
         <p:nvPr/>
       </p:nvGrpSpPr>
@@ -977,7 +975,7 @@
       </p:grpSpPr>
       <p:sp>
         <p:nvSpPr>
-          <p:cNvPr id="83" name="Shape 83"/>
+          <p:cNvPr id="86" name="Shape 86"/>
           <p:cNvSpPr/>
           <p:nvPr>
             <p:ph idx="2" type="sldImg"/>
@@ -1011,7 +1009,7 @@
       </p:sp>
       <p:sp>
         <p:nvSpPr>
-          <p:cNvPr id="84" name="Shape 84"/>
+          <p:cNvPr id="87" name="Shape 87"/>
           <p:cNvSpPr txBox="1"/>
           <p:nvPr>
             <p:ph idx="1" type="body"/>
@@ -1058,7 +1056,7 @@
   <p:cSld>
     <p:spTree>
       <p:nvGrpSpPr>
-        <p:cNvPr id="88" name="Shape 88"/>
+        <p:cNvPr id="91" name="Shape 91"/>
         <p:cNvGrpSpPr/>
         <p:nvPr/>
       </p:nvGrpSpPr>
@@ -1072,7 +1070,7 @@
       </p:grpSpPr>
       <p:sp>
         <p:nvSpPr>
-          <p:cNvPr id="89" name="Shape 89"/>
+          <p:cNvPr id="92" name="Shape 92"/>
           <p:cNvSpPr/>
           <p:nvPr>
             <p:ph idx="2" type="sldImg"/>
@@ -1106,7 +1104,7 @@
       </p:sp>
       <p:sp>
         <p:nvSpPr>
-          <p:cNvPr id="90" name="Shape 90"/>
+          <p:cNvPr id="93" name="Shape 93"/>
           <p:cNvSpPr txBox="1"/>
           <p:nvPr>
             <p:ph idx="1" type="body"/>
@@ -1153,7 +1151,7 @@
   <p:cSld>
     <p:spTree>
       <p:nvGrpSpPr>
-        <p:cNvPr id="95" name="Shape 95"/>
+        <p:cNvPr id="98" name="Shape 98"/>
         <p:cNvGrpSpPr/>
         <p:nvPr/>
       </p:nvGrpSpPr>
@@ -1167,7 +1165,7 @@
       </p:grpSpPr>
       <p:sp>
         <p:nvSpPr>
-          <p:cNvPr id="96" name="Shape 96"/>
+          <p:cNvPr id="99" name="Shape 99"/>
           <p:cNvSpPr/>
           <p:nvPr>
             <p:ph idx="2" type="sldImg"/>
@@ -1201,7 +1199,7 @@
       </p:sp>
       <p:sp>
         <p:nvSpPr>
-          <p:cNvPr id="97" name="Shape 97"/>
+          <p:cNvPr id="100" name="Shape 100"/>
           <p:cNvSpPr txBox="1"/>
           <p:nvPr>
             <p:ph idx="1" type="body"/>
@@ -1248,7 +1246,7 @@
   <p:cSld>
     <p:spTree>
       <p:nvGrpSpPr>
-        <p:cNvPr id="104" name="Shape 104"/>
+        <p:cNvPr id="107" name="Shape 107"/>
         <p:cNvGrpSpPr/>
         <p:nvPr/>
       </p:nvGrpSpPr>
@@ -1262,7 +1260,7 @@
       </p:grpSpPr>
       <p:sp>
         <p:nvSpPr>
-          <p:cNvPr id="105" name="Shape 105"/>
+          <p:cNvPr id="108" name="Shape 108"/>
           <p:cNvSpPr/>
           <p:nvPr>
             <p:ph idx="2" type="sldImg"/>
@@ -1296,7 +1294,7 @@
       </p:sp>
       <p:sp>
         <p:nvSpPr>
-          <p:cNvPr id="106" name="Shape 106"/>
+          <p:cNvPr id="109" name="Shape 109"/>
           <p:cNvSpPr txBox="1"/>
           <p:nvPr>
             <p:ph idx="1" type="body"/>
@@ -1355,35 +1353,144 @@
           <a:chExt cx="0" cy="0"/>
         </a:xfrm>
       </p:grpSpPr>
-      <p:cxnSp>
-        <p:nvCxnSpPr>
+      <p:grpSp>
+        <p:nvGrpSpPr>
           <p:cNvPr id="10" name="Shape 10"/>
-          <p:cNvCxnSpPr/>
+          <p:cNvGrpSpPr/>
           <p:nvPr/>
-        </p:nvCxnSpPr>
-        <p:spPr>
-          <a:xfrm>
-            <a:off x="4278300" y="2751162"/>
-            <a:ext cx="587400" cy="0"/>
-          </a:xfrm>
-          <a:prstGeom prst="straightConnector1">
-            <a:avLst/>
-          </a:prstGeom>
-          <a:noFill/>
-          <a:ln cap="flat" cmpd="sng" w="76200">
+        </p:nvGrpSpPr>
+        <p:grpSpPr>
+          <a:xfrm>
+            <a:off x="4350278" y="2855377"/>
+            <a:ext cx="443588" cy="105632"/>
+            <a:chOff x="4137525" y="2915950"/>
+            <a:chExt cx="869100" cy="207000"/>
+          </a:xfrm>
+        </p:grpSpPr>
+        <p:sp>
+          <p:nvSpPr>
+            <p:cNvPr id="11" name="Shape 11"/>
+            <p:cNvSpPr/>
+            <p:nvPr/>
+          </p:nvSpPr>
+          <p:spPr>
+            <a:xfrm>
+              <a:off x="4468575" y="2915950"/>
+              <a:ext cx="207000" cy="207000"/>
+            </a:xfrm>
+            <a:prstGeom prst="ellipse">
+              <a:avLst/>
+            </a:prstGeom>
             <a:solidFill>
               <a:schemeClr val="dk1"/>
             </a:solidFill>
-            <a:prstDash val="solid"/>
-            <a:round/>
-            <a:headEnd len="med" w="med" type="none"/>
-            <a:tailEnd len="med" w="med" type="none"/>
-          </a:ln>
-        </p:spPr>
-      </p:cxnSp>
+            <a:ln>
+              <a:noFill/>
+            </a:ln>
+          </p:spPr>
+          <p:txBody>
+            <a:bodyPr anchorCtr="0" anchor="ctr" bIns="91425" lIns="91425" rIns="91425" tIns="91425">
+              <a:noAutofit/>
+            </a:bodyPr>
+            <a:lstStyle/>
+            <a:p>
+              <a:pPr lvl="0">
+                <a:spcBef>
+                  <a:spcPts val="0"/>
+                </a:spcBef>
+                <a:buNone/>
+              </a:pPr>
+              <a:r>
+                <a:t/>
+              </a:r>
+              <a:endParaRPr/>
+            </a:p>
+          </p:txBody>
+        </p:sp>
+        <p:sp>
+          <p:nvSpPr>
+            <p:cNvPr id="12" name="Shape 12"/>
+            <p:cNvSpPr/>
+            <p:nvPr/>
+          </p:nvSpPr>
+          <p:spPr>
+            <a:xfrm>
+              <a:off x="4799625" y="2915950"/>
+              <a:ext cx="207000" cy="207000"/>
+            </a:xfrm>
+            <a:prstGeom prst="ellipse">
+              <a:avLst/>
+            </a:prstGeom>
+            <a:solidFill>
+              <a:schemeClr val="dk1"/>
+            </a:solidFill>
+            <a:ln>
+              <a:noFill/>
+            </a:ln>
+          </p:spPr>
+          <p:txBody>
+            <a:bodyPr anchorCtr="0" anchor="ctr" bIns="91425" lIns="91425" rIns="91425" tIns="91425">
+              <a:noAutofit/>
+            </a:bodyPr>
+            <a:lstStyle/>
+            <a:p>
+              <a:pPr lvl="0">
+                <a:spcBef>
+                  <a:spcPts val="0"/>
+                </a:spcBef>
+                <a:buNone/>
+              </a:pPr>
+              <a:r>
+                <a:t/>
+              </a:r>
+              <a:endParaRPr/>
+            </a:p>
+          </p:txBody>
+        </p:sp>
+        <p:sp>
+          <p:nvSpPr>
+            <p:cNvPr id="13" name="Shape 13"/>
+            <p:cNvSpPr/>
+            <p:nvPr/>
+          </p:nvSpPr>
+          <p:spPr>
+            <a:xfrm>
+              <a:off x="4137525" y="2915950"/>
+              <a:ext cx="207000" cy="207000"/>
+            </a:xfrm>
+            <a:prstGeom prst="ellipse">
+              <a:avLst/>
+            </a:prstGeom>
+            <a:solidFill>
+              <a:schemeClr val="dk1"/>
+            </a:solidFill>
+            <a:ln>
+              <a:noFill/>
+            </a:ln>
+          </p:spPr>
+          <p:txBody>
+            <a:bodyPr anchorCtr="0" anchor="ctr" bIns="91425" lIns="91425" rIns="91425" tIns="91425">
+              <a:noAutofit/>
+            </a:bodyPr>
+            <a:lstStyle/>
+            <a:p>
+              <a:pPr lvl="0">
+                <a:spcBef>
+                  <a:spcPts val="0"/>
+                </a:spcBef>
+                <a:buNone/>
+              </a:pPr>
+              <a:r>
+                <a:t/>
+              </a:r>
+              <a:endParaRPr/>
+            </a:p>
+          </p:txBody>
+        </p:sp>
+      </p:grpSp>
       <p:sp>
         <p:nvSpPr>
-          <p:cNvPr id="11" name="Shape 11"/>
+          <p:cNvPr id="14" name="Shape 14"/>
           <p:cNvSpPr txBox="1"/>
           <p:nvPr>
             <p:ph type="ctrTitle"/>
@@ -1391,8 +1498,8 @@
         </p:nvSpPr>
         <p:spPr>
           <a:xfrm>
-            <a:off x="311700" y="595975"/>
-            <a:ext cx="8520600" cy="1957800"/>
+            <a:off x="671257" y="990800"/>
+            <a:ext cx="7801500" cy="1730100"/>
           </a:xfrm>
           <a:prstGeom prst="rect">
             <a:avLst/>
@@ -1406,63 +1513,63 @@
                 <a:spcPts val="0"/>
               </a:spcBef>
               <a:buSzPct val="100000"/>
-              <a:defRPr sz="5400"/>
+              <a:defRPr sz="4800"/>
             </a:lvl1pPr>
             <a:lvl2pPr lvl="1" algn="ctr">
               <a:spcBef>
                 <a:spcPts val="0"/>
               </a:spcBef>
               <a:buSzPct val="100000"/>
-              <a:defRPr sz="5400"/>
+              <a:defRPr sz="4800"/>
             </a:lvl2pPr>
             <a:lvl3pPr lvl="2" algn="ctr">
               <a:spcBef>
                 <a:spcPts val="0"/>
               </a:spcBef>
               <a:buSzPct val="100000"/>
-              <a:defRPr sz="5400"/>
+              <a:defRPr sz="4800"/>
             </a:lvl3pPr>
             <a:lvl4pPr lvl="3" algn="ctr">
               <a:spcBef>
                 <a:spcPts val="0"/>
               </a:spcBef>
               <a:buSzPct val="100000"/>
-              <a:defRPr sz="5400"/>
+              <a:defRPr sz="4800"/>
             </a:lvl4pPr>
             <a:lvl5pPr lvl="4" algn="ctr">
               <a:spcBef>
                 <a:spcPts val="0"/>
               </a:spcBef>
               <a:buSzPct val="100000"/>
-              <a:defRPr sz="5400"/>
+              <a:defRPr sz="4800"/>
             </a:lvl5pPr>
             <a:lvl6pPr lvl="5" algn="ctr">
               <a:spcBef>
                 <a:spcPts val="0"/>
               </a:spcBef>
               <a:buSzPct val="100000"/>
-              <a:defRPr sz="5400"/>
+              <a:defRPr sz="4800"/>
             </a:lvl6pPr>
             <a:lvl7pPr lvl="6" algn="ctr">
               <a:spcBef>
                 <a:spcPts val="0"/>
               </a:spcBef>
               <a:buSzPct val="100000"/>
-              <a:defRPr sz="5400"/>
+              <a:defRPr sz="4800"/>
             </a:lvl7pPr>
             <a:lvl8pPr lvl="7" algn="ctr">
               <a:spcBef>
                 <a:spcPts val="0"/>
               </a:spcBef>
               <a:buSzPct val="100000"/>
-              <a:defRPr sz="5400"/>
+              <a:defRPr sz="4800"/>
             </a:lvl8pPr>
             <a:lvl9pPr lvl="8" algn="ctr">
               <a:spcBef>
                 <a:spcPts val="0"/>
               </a:spcBef>
               <a:buSzPct val="100000"/>
-              <a:defRPr sz="5400"/>
+              <a:defRPr sz="4800"/>
             </a:lvl9pPr>
           </a:lstStyle>
           <a:p/>
@@ -1470,7 +1577,7 @@
       </p:sp>
       <p:sp>
         <p:nvSpPr>
-          <p:cNvPr id="12" name="Shape 12"/>
+          <p:cNvPr id="15" name="Shape 15"/>
           <p:cNvSpPr txBox="1"/>
           <p:nvPr>
             <p:ph idx="1" type="subTitle"/>
@@ -1478,8 +1585,8 @@
         </p:nvSpPr>
         <p:spPr>
           <a:xfrm>
-            <a:off x="311700" y="3165823"/>
-            <a:ext cx="8520600" cy="733500"/>
+            <a:off x="671250" y="3174875"/>
+            <a:ext cx="7801500" cy="792600"/>
           </a:xfrm>
           <a:prstGeom prst="rect">
             <a:avLst/>
@@ -1500,7 +1607,7 @@
               </a:spcAft>
               <a:buSzPct val="100000"/>
               <a:buNone/>
-              <a:defRPr sz="2400"/>
+              <a:defRPr sz="2100"/>
             </a:lvl1pPr>
             <a:lvl2pPr lvl="1" algn="ctr">
               <a:lnSpc>
@@ -1514,7 +1621,7 @@
               </a:spcAft>
               <a:buSzPct val="100000"/>
               <a:buNone/>
-              <a:defRPr sz="2400"/>
+              <a:defRPr sz="2100"/>
             </a:lvl2pPr>
             <a:lvl3pPr lvl="2" algn="ctr">
               <a:lnSpc>
@@ -1528,7 +1635,7 @@
               </a:spcAft>
               <a:buSzPct val="100000"/>
               <a:buNone/>
-              <a:defRPr sz="2400"/>
+              <a:defRPr sz="2100"/>
             </a:lvl3pPr>
             <a:lvl4pPr lvl="3" algn="ctr">
               <a:lnSpc>
@@ -1542,7 +1649,7 @@
               </a:spcAft>
               <a:buSzPct val="100000"/>
               <a:buNone/>
-              <a:defRPr sz="2400"/>
+              <a:defRPr sz="2100"/>
             </a:lvl4pPr>
             <a:lvl5pPr lvl="4" algn="ctr">
               <a:lnSpc>
@@ -1556,7 +1663,7 @@
               </a:spcAft>
               <a:buSzPct val="100000"/>
               <a:buNone/>
-              <a:defRPr sz="2400"/>
+              <a:defRPr sz="2100"/>
             </a:lvl5pPr>
             <a:lvl6pPr lvl="5" algn="ctr">
               <a:lnSpc>
@@ -1570,7 +1677,7 @@
               </a:spcAft>
               <a:buSzPct val="100000"/>
               <a:buNone/>
-              <a:defRPr sz="2400"/>
+              <a:defRPr sz="2100"/>
             </a:lvl6pPr>
             <a:lvl7pPr lvl="6" algn="ctr">
               <a:lnSpc>
@@ -1584,7 +1691,7 @@
               </a:spcAft>
               <a:buSzPct val="100000"/>
               <a:buNone/>
-              <a:defRPr sz="2400"/>
+              <a:defRPr sz="2100"/>
             </a:lvl7pPr>
             <a:lvl8pPr lvl="7" algn="ctr">
               <a:lnSpc>
@@ -1598,7 +1705,7 @@
               </a:spcAft>
               <a:buSzPct val="100000"/>
               <a:buNone/>
-              <a:defRPr sz="2400"/>
+              <a:defRPr sz="2100"/>
             </a:lvl8pPr>
             <a:lvl9pPr lvl="8" algn="ctr">
               <a:lnSpc>
@@ -1612,7 +1719,7 @@
               </a:spcAft>
               <a:buSzPct val="100000"/>
               <a:buNone/>
-              <a:defRPr sz="2400"/>
+              <a:defRPr sz="2100"/>
             </a:lvl9pPr>
           </a:lstStyle>
           <a:p/>
@@ -1620,7 +1727,7 @@
       </p:sp>
       <p:sp>
         <p:nvSpPr>
-          <p:cNvPr id="13" name="Shape 13"/>
+          <p:cNvPr id="16" name="Shape 16"/>
           <p:cNvSpPr txBox="1"/>
           <p:nvPr>
             <p:ph idx="12" type="sldNum"/>
@@ -1628,7 +1735,7 @@
         </p:nvSpPr>
         <p:spPr>
           <a:xfrm>
-            <a:off x="8472457" y="4663216"/>
+            <a:off x="8490250" y="4681009"/>
             <a:ext cx="548700" cy="393600"/>
           </a:xfrm>
           <a:prstGeom prst="rect">
@@ -1667,7 +1774,7 @@
   <p:cSld name="Big number">
     <p:spTree>
       <p:nvGrpSpPr>
-        <p:cNvPr id="46" name="Shape 46"/>
+        <p:cNvPr id="49" name="Shape 49"/>
         <p:cNvGrpSpPr/>
         <p:nvPr/>
       </p:nvGrpSpPr>
@@ -1681,7 +1788,7 @@
       </p:grpSpPr>
       <p:sp>
         <p:nvSpPr>
-          <p:cNvPr id="47" name="Shape 47"/>
+          <p:cNvPr id="50" name="Shape 50"/>
           <p:cNvSpPr txBox="1"/>
           <p:nvPr>
             <p:ph type="title"/>
@@ -1689,141 +1796,78 @@
         </p:nvSpPr>
         <p:spPr>
           <a:xfrm>
-            <a:off x="311700" y="1167925"/>
-            <a:ext cx="8520600" cy="1980000"/>
+            <a:off x="311700" y="1255275"/>
+            <a:ext cx="8520600" cy="1890600"/>
           </a:xfrm>
           <a:prstGeom prst="rect">
             <a:avLst/>
           </a:prstGeom>
         </p:spPr>
         <p:txBody>
-          <a:bodyPr anchorCtr="0" anchor="ctr" bIns="91425" lIns="91425" rIns="91425" tIns="91425"/>
+          <a:bodyPr anchorCtr="0" anchor="b" bIns="91425" lIns="91425" rIns="91425" tIns="91425"/>
           <a:lstStyle>
             <a:lvl1pPr lvl="0" algn="ctr">
               <a:spcBef>
                 <a:spcPts val="0"/>
               </a:spcBef>
-              <a:buClr>
-                <a:schemeClr val="dk1"/>
-              </a:buClr>
-              <a:buSzPct val="100000"/>
-              <a:defRPr sz="11000">
-                <a:solidFill>
-                  <a:schemeClr val="dk1"/>
-                </a:solidFill>
-              </a:defRPr>
+              <a:buSzPct val="100000"/>
+              <a:defRPr sz="12000"/>
             </a:lvl1pPr>
             <a:lvl2pPr lvl="1" algn="ctr">
               <a:spcBef>
                 <a:spcPts val="0"/>
               </a:spcBef>
-              <a:buClr>
-                <a:schemeClr val="dk1"/>
-              </a:buClr>
-              <a:buSzPct val="100000"/>
-              <a:defRPr sz="11000">
-                <a:solidFill>
-                  <a:schemeClr val="dk1"/>
-                </a:solidFill>
-              </a:defRPr>
+              <a:buSzPct val="100000"/>
+              <a:defRPr sz="12000"/>
             </a:lvl2pPr>
             <a:lvl3pPr lvl="2" algn="ctr">
               <a:spcBef>
                 <a:spcPts val="0"/>
               </a:spcBef>
-              <a:buClr>
-                <a:schemeClr val="dk1"/>
-              </a:buClr>
-              <a:buSzPct val="100000"/>
-              <a:defRPr sz="11000">
-                <a:solidFill>
-                  <a:schemeClr val="dk1"/>
-                </a:solidFill>
-              </a:defRPr>
+              <a:buSzPct val="100000"/>
+              <a:defRPr sz="12000"/>
             </a:lvl3pPr>
             <a:lvl4pPr lvl="3" algn="ctr">
               <a:spcBef>
                 <a:spcPts val="0"/>
               </a:spcBef>
-              <a:buClr>
-                <a:schemeClr val="dk1"/>
-              </a:buClr>
-              <a:buSzPct val="100000"/>
-              <a:defRPr sz="11000">
-                <a:solidFill>
-                  <a:schemeClr val="dk1"/>
-                </a:solidFill>
-              </a:defRPr>
+              <a:buSzPct val="100000"/>
+              <a:defRPr sz="12000"/>
             </a:lvl4pPr>
             <a:lvl5pPr lvl="4" algn="ctr">
               <a:spcBef>
                 <a:spcPts val="0"/>
               </a:spcBef>
-              <a:buClr>
-                <a:schemeClr val="dk1"/>
-              </a:buClr>
-              <a:buSzPct val="100000"/>
-              <a:defRPr sz="11000">
-                <a:solidFill>
-                  <a:schemeClr val="dk1"/>
-                </a:solidFill>
-              </a:defRPr>
+              <a:buSzPct val="100000"/>
+              <a:defRPr sz="12000"/>
             </a:lvl5pPr>
             <a:lvl6pPr lvl="5" algn="ctr">
               <a:spcBef>
                 <a:spcPts val="0"/>
               </a:spcBef>
-              <a:buClr>
-                <a:schemeClr val="dk1"/>
-              </a:buClr>
-              <a:buSzPct val="100000"/>
-              <a:defRPr sz="11000">
-                <a:solidFill>
-                  <a:schemeClr val="dk1"/>
-                </a:solidFill>
-              </a:defRPr>
+              <a:buSzPct val="100000"/>
+              <a:defRPr sz="12000"/>
             </a:lvl6pPr>
             <a:lvl7pPr lvl="6" algn="ctr">
               <a:spcBef>
                 <a:spcPts val="0"/>
               </a:spcBef>
-              <a:buClr>
-                <a:schemeClr val="dk1"/>
-              </a:buClr>
-              <a:buSzPct val="100000"/>
-              <a:defRPr sz="11000">
-                <a:solidFill>
-                  <a:schemeClr val="dk1"/>
-                </a:solidFill>
-              </a:defRPr>
+              <a:buSzPct val="100000"/>
+              <a:defRPr sz="12000"/>
             </a:lvl7pPr>
             <a:lvl8pPr lvl="7" algn="ctr">
               <a:spcBef>
                 <a:spcPts val="0"/>
               </a:spcBef>
-              <a:buClr>
-                <a:schemeClr val="dk1"/>
-              </a:buClr>
-              <a:buSzPct val="100000"/>
-              <a:defRPr sz="11000">
-                <a:solidFill>
-                  <a:schemeClr val="dk1"/>
-                </a:solidFill>
-              </a:defRPr>
+              <a:buSzPct val="100000"/>
+              <a:defRPr sz="12000"/>
             </a:lvl8pPr>
             <a:lvl9pPr lvl="8" algn="ctr">
               <a:spcBef>
                 <a:spcPts val="0"/>
               </a:spcBef>
-              <a:buClr>
-                <a:schemeClr val="dk1"/>
-              </a:buClr>
-              <a:buSzPct val="100000"/>
-              <a:defRPr sz="11000">
-                <a:solidFill>
-                  <a:schemeClr val="dk1"/>
-                </a:solidFill>
-              </a:defRPr>
+              <a:buSzPct val="100000"/>
+              <a:defRPr sz="12000"/>
             </a:lvl9pPr>
           </a:lstStyle>
           <a:p/>
@@ -1831,7 +1875,7 @@
       </p:sp>
       <p:sp>
         <p:nvSpPr>
-          <p:cNvPr id="48" name="Shape 48"/>
+          <p:cNvPr id="51" name="Shape 51"/>
           <p:cNvSpPr txBox="1"/>
           <p:nvPr>
             <p:ph idx="1" type="body"/>
@@ -1839,8 +1883,8 @@
         </p:nvSpPr>
         <p:spPr>
           <a:xfrm>
-            <a:off x="311700" y="3224250"/>
-            <a:ext cx="8520600" cy="1071600"/>
+            <a:off x="311700" y="3228425"/>
+            <a:ext cx="8520600" cy="1300800"/>
           </a:xfrm>
           <a:prstGeom prst="rect">
             <a:avLst/>
@@ -1909,7 +1953,7 @@
       </p:sp>
       <p:sp>
         <p:nvSpPr>
-          <p:cNvPr id="49" name="Shape 49"/>
+          <p:cNvPr id="52" name="Shape 52"/>
           <p:cNvSpPr txBox="1"/>
           <p:nvPr>
             <p:ph idx="12" type="sldNum"/>
@@ -1917,7 +1961,7 @@
         </p:nvSpPr>
         <p:spPr>
           <a:xfrm>
-            <a:off x="8472457" y="4663216"/>
+            <a:off x="8490250" y="4681009"/>
             <a:ext cx="548700" cy="393600"/>
           </a:xfrm>
           <a:prstGeom prst="rect">
@@ -1956,7 +2000,7 @@
   <p:cSld name="Blank">
     <p:spTree>
       <p:nvGrpSpPr>
-        <p:cNvPr id="50" name="Shape 50"/>
+        <p:cNvPr id="53" name="Shape 53"/>
         <p:cNvGrpSpPr/>
         <p:nvPr/>
       </p:nvGrpSpPr>
@@ -1970,7 +2014,7 @@
       </p:grpSpPr>
       <p:sp>
         <p:nvSpPr>
-          <p:cNvPr id="51" name="Shape 51"/>
+          <p:cNvPr id="54" name="Shape 54"/>
           <p:cNvSpPr txBox="1"/>
           <p:nvPr>
             <p:ph idx="12" type="sldNum"/>
@@ -1978,7 +2022,7 @@
         </p:nvSpPr>
         <p:spPr>
           <a:xfrm>
-            <a:off x="8472457" y="4663216"/>
+            <a:off x="8490250" y="4681009"/>
             <a:ext cx="548700" cy="393600"/>
           </a:xfrm>
           <a:prstGeom prst="rect">
@@ -2015,228 +2059,6 @@
 <file path=ppt/slideLayouts/slideLayout2.xml><?xml version="1.0" encoding="utf-8"?>
 <p:sldLayout xmlns:a="http://schemas.openxmlformats.org/drawingml/2006/main" xmlns:r="http://schemas.openxmlformats.org/officeDocument/2006/relationships" xmlns:mc="http://schemas.openxmlformats.org/markup-compatibility/2006" xmlns:mv="urn:schemas-microsoft-com:mac:vml" xmlns:p="http://schemas.openxmlformats.org/presentationml/2006/main" xmlns:c="http://schemas.openxmlformats.org/drawingml/2006/chart" xmlns:dgm="http://schemas.openxmlformats.org/drawingml/2006/diagram" xmlns:o="urn:schemas-microsoft-com:office:office" xmlns:v="urn:schemas-microsoft-com:vml" xmlns:pvml="urn:schemas-microsoft-com:office:powerpoint" xmlns:com="http://schemas.openxmlformats.org/drawingml/2006/compatibility" xmlns:p14="http://schemas.microsoft.com/office/powerpoint/2010/main" type="secHead">
   <p:cSld name="Section header">
-    <p:bg>
-      <p:bgPr>
-        <a:solidFill>
-          <a:schemeClr val="dk1"/>
-        </a:solidFill>
-      </p:bgPr>
-    </p:bg>
-    <p:spTree>
-      <p:nvGrpSpPr>
-        <p:cNvPr id="14" name="Shape 14"/>
-        <p:cNvGrpSpPr/>
-        <p:nvPr/>
-      </p:nvGrpSpPr>
-      <p:grpSpPr>
-        <a:xfrm>
-          <a:off x="0" y="0"/>
-          <a:ext cx="0" cy="0"/>
-          <a:chOff x="0" y="0"/>
-          <a:chExt cx="0" cy="0"/>
-        </a:xfrm>
-      </p:grpSpPr>
-      <p:sp>
-        <p:nvSpPr>
-          <p:cNvPr id="15" name="Shape 15"/>
-          <p:cNvSpPr txBox="1"/>
-          <p:nvPr>
-            <p:ph type="title"/>
-          </p:nvPr>
-        </p:nvSpPr>
-        <p:spPr>
-          <a:xfrm>
-            <a:off x="311700" y="2480550"/>
-            <a:ext cx="8114400" cy="2445900"/>
-          </a:xfrm>
-          <a:prstGeom prst="rect">
-            <a:avLst/>
-          </a:prstGeom>
-        </p:spPr>
-        <p:txBody>
-          <a:bodyPr anchorCtr="0" anchor="b" bIns="91425" lIns="91425" rIns="91425" tIns="91425"/>
-          <a:lstStyle>
-            <a:lvl1pPr lvl="0">
-              <a:spcBef>
-                <a:spcPts val="0"/>
-              </a:spcBef>
-              <a:buClr>
-                <a:schemeClr val="lt1"/>
-              </a:buClr>
-              <a:buSzPct val="100000"/>
-              <a:defRPr sz="6800">
-                <a:solidFill>
-                  <a:schemeClr val="lt1"/>
-                </a:solidFill>
-              </a:defRPr>
-            </a:lvl1pPr>
-            <a:lvl2pPr lvl="1">
-              <a:spcBef>
-                <a:spcPts val="0"/>
-              </a:spcBef>
-              <a:buClr>
-                <a:schemeClr val="lt1"/>
-              </a:buClr>
-              <a:buSzPct val="100000"/>
-              <a:defRPr sz="6800">
-                <a:solidFill>
-                  <a:schemeClr val="lt1"/>
-                </a:solidFill>
-              </a:defRPr>
-            </a:lvl2pPr>
-            <a:lvl3pPr lvl="2">
-              <a:spcBef>
-                <a:spcPts val="0"/>
-              </a:spcBef>
-              <a:buClr>
-                <a:schemeClr val="lt1"/>
-              </a:buClr>
-              <a:buSzPct val="100000"/>
-              <a:defRPr sz="6800">
-                <a:solidFill>
-                  <a:schemeClr val="lt1"/>
-                </a:solidFill>
-              </a:defRPr>
-            </a:lvl3pPr>
-            <a:lvl4pPr lvl="3">
-              <a:spcBef>
-                <a:spcPts val="0"/>
-              </a:spcBef>
-              <a:buClr>
-                <a:schemeClr val="lt1"/>
-              </a:buClr>
-              <a:buSzPct val="100000"/>
-              <a:defRPr sz="6800">
-                <a:solidFill>
-                  <a:schemeClr val="lt1"/>
-                </a:solidFill>
-              </a:defRPr>
-            </a:lvl4pPr>
-            <a:lvl5pPr lvl="4">
-              <a:spcBef>
-                <a:spcPts val="0"/>
-              </a:spcBef>
-              <a:buClr>
-                <a:schemeClr val="lt1"/>
-              </a:buClr>
-              <a:buSzPct val="100000"/>
-              <a:defRPr sz="6800">
-                <a:solidFill>
-                  <a:schemeClr val="lt1"/>
-                </a:solidFill>
-              </a:defRPr>
-            </a:lvl5pPr>
-            <a:lvl6pPr lvl="5">
-              <a:spcBef>
-                <a:spcPts val="0"/>
-              </a:spcBef>
-              <a:buClr>
-                <a:schemeClr val="lt1"/>
-              </a:buClr>
-              <a:buSzPct val="100000"/>
-              <a:defRPr sz="6800">
-                <a:solidFill>
-                  <a:schemeClr val="lt1"/>
-                </a:solidFill>
-              </a:defRPr>
-            </a:lvl6pPr>
-            <a:lvl7pPr lvl="6">
-              <a:spcBef>
-                <a:spcPts val="0"/>
-              </a:spcBef>
-              <a:buClr>
-                <a:schemeClr val="lt1"/>
-              </a:buClr>
-              <a:buSzPct val="100000"/>
-              <a:defRPr sz="6800">
-                <a:solidFill>
-                  <a:schemeClr val="lt1"/>
-                </a:solidFill>
-              </a:defRPr>
-            </a:lvl7pPr>
-            <a:lvl8pPr lvl="7">
-              <a:spcBef>
-                <a:spcPts val="0"/>
-              </a:spcBef>
-              <a:buClr>
-                <a:schemeClr val="lt1"/>
-              </a:buClr>
-              <a:buSzPct val="100000"/>
-              <a:defRPr sz="6800">
-                <a:solidFill>
-                  <a:schemeClr val="lt1"/>
-                </a:solidFill>
-              </a:defRPr>
-            </a:lvl8pPr>
-            <a:lvl9pPr lvl="8">
-              <a:spcBef>
-                <a:spcPts val="0"/>
-              </a:spcBef>
-              <a:buClr>
-                <a:schemeClr val="lt1"/>
-              </a:buClr>
-              <a:buSzPct val="100000"/>
-              <a:defRPr sz="6800">
-                <a:solidFill>
-                  <a:schemeClr val="lt1"/>
-                </a:solidFill>
-              </a:defRPr>
-            </a:lvl9pPr>
-          </a:lstStyle>
-          <a:p/>
-        </p:txBody>
-      </p:sp>
-      <p:sp>
-        <p:nvSpPr>
-          <p:cNvPr id="16" name="Shape 16"/>
-          <p:cNvSpPr txBox="1"/>
-          <p:nvPr>
-            <p:ph idx="12" type="sldNum"/>
-          </p:nvPr>
-        </p:nvSpPr>
-        <p:spPr>
-          <a:xfrm>
-            <a:off x="8472457" y="4663216"/>
-            <a:ext cx="548700" cy="393600"/>
-          </a:xfrm>
-          <a:prstGeom prst="rect">
-            <a:avLst/>
-          </a:prstGeom>
-        </p:spPr>
-        <p:txBody>
-          <a:bodyPr anchorCtr="0" anchor="ctr" bIns="91425" lIns="91425" rIns="91425" tIns="91425">
-            <a:noAutofit/>
-          </a:bodyPr>
-          <a:lstStyle/>
-          <a:p>
-            <a:pPr lvl="0">
-              <a:spcBef>
-                <a:spcPts val="0"/>
-              </a:spcBef>
-              <a:buNone/>
-            </a:pPr>
-            <a:fld id="{00000000-1234-1234-1234-123412341234}" type="slidenum">
-              <a:rPr lang="en">
-                <a:solidFill>
-                  <a:schemeClr val="lt1"/>
-                </a:solidFill>
-              </a:rPr>
-              <a:t>‹#›</a:t>
-            </a:fld>
-          </a:p>
-        </p:txBody>
-      </p:sp>
-    </p:spTree>
-  </p:cSld>
-  <p:clrMapOvr>
-    <a:masterClrMapping/>
-  </p:clrMapOvr>
-</p:sldLayout>
-</file>
-
-<file path=ppt/slideLayouts/slideLayout3.xml><?xml version="1.0" encoding="utf-8"?>
-<p:sldLayout xmlns:a="http://schemas.openxmlformats.org/drawingml/2006/main" xmlns:r="http://schemas.openxmlformats.org/officeDocument/2006/relationships" xmlns:mc="http://schemas.openxmlformats.org/markup-compatibility/2006" xmlns:mv="urn:schemas-microsoft-com:mac:vml" xmlns:p="http://schemas.openxmlformats.org/presentationml/2006/main" xmlns:c="http://schemas.openxmlformats.org/drawingml/2006/chart" xmlns:dgm="http://schemas.openxmlformats.org/drawingml/2006/diagram" xmlns:o="urn:schemas-microsoft-com:office:office" xmlns:v="urn:schemas-microsoft-com:vml" xmlns:pvml="urn:schemas-microsoft-com:office:powerpoint" xmlns:com="http://schemas.openxmlformats.org/drawingml/2006/compatibility" xmlns:p14="http://schemas.microsoft.com/office/powerpoint/2010/main" type="tx">
-  <p:cSld name="Title and body">
     <p:spTree>
       <p:nvGrpSpPr>
         <p:cNvPr id="17" name="Shape 17"/>
@@ -2261,69 +2083,78 @@
         </p:nvSpPr>
         <p:spPr>
           <a:xfrm>
-            <a:off x="311700" y="445025"/>
-            <a:ext cx="8520600" cy="572700"/>
+            <a:off x="671250" y="2141250"/>
+            <a:ext cx="7852200" cy="861000"/>
           </a:xfrm>
           <a:prstGeom prst="rect">
             <a:avLst/>
           </a:prstGeom>
         </p:spPr>
         <p:txBody>
-          <a:bodyPr anchorCtr="0" anchor="t" bIns="91425" lIns="91425" rIns="91425" tIns="91425"/>
+          <a:bodyPr anchorCtr="0" anchor="ctr" bIns="91425" lIns="91425" rIns="91425" tIns="91425"/>
           <a:lstStyle>
-            <a:lvl1pPr lvl="0">
-              <a:spcBef>
-                <a:spcPts val="0"/>
-              </a:spcBef>
-              <a:defRPr/>
+            <a:lvl1pPr lvl="0" algn="ctr">
+              <a:spcBef>
+                <a:spcPts val="0"/>
+              </a:spcBef>
+              <a:buSzPct val="100000"/>
+              <a:defRPr sz="3600"/>
             </a:lvl1pPr>
-            <a:lvl2pPr lvl="1">
-              <a:spcBef>
-                <a:spcPts val="0"/>
-              </a:spcBef>
-              <a:defRPr/>
+            <a:lvl2pPr lvl="1" algn="ctr">
+              <a:spcBef>
+                <a:spcPts val="0"/>
+              </a:spcBef>
+              <a:buSzPct val="100000"/>
+              <a:defRPr sz="3600"/>
             </a:lvl2pPr>
-            <a:lvl3pPr lvl="2">
-              <a:spcBef>
-                <a:spcPts val="0"/>
-              </a:spcBef>
-              <a:defRPr/>
+            <a:lvl3pPr lvl="2" algn="ctr">
+              <a:spcBef>
+                <a:spcPts val="0"/>
+              </a:spcBef>
+              <a:buSzPct val="100000"/>
+              <a:defRPr sz="3600"/>
             </a:lvl3pPr>
-            <a:lvl4pPr lvl="3">
-              <a:spcBef>
-                <a:spcPts val="0"/>
-              </a:spcBef>
-              <a:defRPr/>
+            <a:lvl4pPr lvl="3" algn="ctr">
+              <a:spcBef>
+                <a:spcPts val="0"/>
+              </a:spcBef>
+              <a:buSzPct val="100000"/>
+              <a:defRPr sz="3600"/>
             </a:lvl4pPr>
-            <a:lvl5pPr lvl="4">
-              <a:spcBef>
-                <a:spcPts val="0"/>
-              </a:spcBef>
-              <a:defRPr/>
+            <a:lvl5pPr lvl="4" algn="ctr">
+              <a:spcBef>
+                <a:spcPts val="0"/>
+              </a:spcBef>
+              <a:buSzPct val="100000"/>
+              <a:defRPr sz="3600"/>
             </a:lvl5pPr>
-            <a:lvl6pPr lvl="5">
-              <a:spcBef>
-                <a:spcPts val="0"/>
-              </a:spcBef>
-              <a:defRPr/>
+            <a:lvl6pPr lvl="5" algn="ctr">
+              <a:spcBef>
+                <a:spcPts val="0"/>
+              </a:spcBef>
+              <a:buSzPct val="100000"/>
+              <a:defRPr sz="3600"/>
             </a:lvl6pPr>
-            <a:lvl7pPr lvl="6">
-              <a:spcBef>
-                <a:spcPts val="0"/>
-              </a:spcBef>
-              <a:defRPr/>
+            <a:lvl7pPr lvl="6" algn="ctr">
+              <a:spcBef>
+                <a:spcPts val="0"/>
+              </a:spcBef>
+              <a:buSzPct val="100000"/>
+              <a:defRPr sz="3600"/>
             </a:lvl7pPr>
-            <a:lvl8pPr lvl="7">
-              <a:spcBef>
-                <a:spcPts val="0"/>
-              </a:spcBef>
-              <a:defRPr/>
+            <a:lvl8pPr lvl="7" algn="ctr">
+              <a:spcBef>
+                <a:spcPts val="0"/>
+              </a:spcBef>
+              <a:buSzPct val="100000"/>
+              <a:defRPr sz="3600"/>
             </a:lvl8pPr>
-            <a:lvl9pPr lvl="8">
-              <a:spcBef>
-                <a:spcPts val="0"/>
-              </a:spcBef>
-              <a:defRPr/>
+            <a:lvl9pPr lvl="8" algn="ctr">
+              <a:spcBef>
+                <a:spcPts val="0"/>
+              </a:spcBef>
+              <a:buSzPct val="100000"/>
+              <a:defRPr sz="3600"/>
             </a:lvl9pPr>
           </a:lstStyle>
           <a:p/>
@@ -2334,13 +2165,74 @@
           <p:cNvPr id="19" name="Shape 19"/>
           <p:cNvSpPr txBox="1"/>
           <p:nvPr>
-            <p:ph idx="1" type="body"/>
+            <p:ph idx="12" type="sldNum"/>
           </p:nvPr>
         </p:nvSpPr>
         <p:spPr>
           <a:xfrm>
-            <a:off x="311700" y="1152475"/>
-            <a:ext cx="8520600" cy="3416400"/>
+            <a:off x="8490250" y="4681009"/>
+            <a:ext cx="548700" cy="393600"/>
+          </a:xfrm>
+          <a:prstGeom prst="rect">
+            <a:avLst/>
+          </a:prstGeom>
+        </p:spPr>
+        <p:txBody>
+          <a:bodyPr anchorCtr="0" anchor="ctr" bIns="91425" lIns="91425" rIns="91425" tIns="91425">
+            <a:noAutofit/>
+          </a:bodyPr>
+          <a:lstStyle/>
+          <a:p>
+            <a:pPr lvl="0">
+              <a:spcBef>
+                <a:spcPts val="0"/>
+              </a:spcBef>
+              <a:buNone/>
+            </a:pPr>
+            <a:fld id="{00000000-1234-1234-1234-123412341234}" type="slidenum">
+              <a:rPr lang="en"/>
+              <a:t>‹#›</a:t>
+            </a:fld>
+          </a:p>
+        </p:txBody>
+      </p:sp>
+    </p:spTree>
+  </p:cSld>
+  <p:clrMapOvr>
+    <a:masterClrMapping/>
+  </p:clrMapOvr>
+</p:sldLayout>
+</file>
+
+<file path=ppt/slideLayouts/slideLayout3.xml><?xml version="1.0" encoding="utf-8"?>
+<p:sldLayout xmlns:a="http://schemas.openxmlformats.org/drawingml/2006/main" xmlns:r="http://schemas.openxmlformats.org/officeDocument/2006/relationships" xmlns:mc="http://schemas.openxmlformats.org/markup-compatibility/2006" xmlns:mv="urn:schemas-microsoft-com:mac:vml" xmlns:p="http://schemas.openxmlformats.org/presentationml/2006/main" xmlns:c="http://schemas.openxmlformats.org/drawingml/2006/chart" xmlns:dgm="http://schemas.openxmlformats.org/drawingml/2006/diagram" xmlns:o="urn:schemas-microsoft-com:office:office" xmlns:v="urn:schemas-microsoft-com:vml" xmlns:pvml="urn:schemas-microsoft-com:office:powerpoint" xmlns:com="http://schemas.openxmlformats.org/drawingml/2006/compatibility" xmlns:p14="http://schemas.microsoft.com/office/powerpoint/2010/main" type="tx">
+  <p:cSld name="Title and body">
+    <p:spTree>
+      <p:nvGrpSpPr>
+        <p:cNvPr id="20" name="Shape 20"/>
+        <p:cNvGrpSpPr/>
+        <p:nvPr/>
+      </p:nvGrpSpPr>
+      <p:grpSpPr>
+        <a:xfrm>
+          <a:off x="0" y="0"/>
+          <a:ext cx="0" cy="0"/>
+          <a:chOff x="0" y="0"/>
+          <a:chExt cx="0" cy="0"/>
+        </a:xfrm>
+      </p:grpSpPr>
+      <p:sp>
+        <p:nvSpPr>
+          <p:cNvPr id="21" name="Shape 21"/>
+          <p:cNvSpPr txBox="1"/>
+          <p:nvPr>
+            <p:ph type="title"/>
+          </p:nvPr>
+        </p:nvSpPr>
+        <p:spPr>
+          <a:xfrm>
+            <a:off x="311700" y="445025"/>
+            <a:ext cx="8520600" cy="572700"/>
           </a:xfrm>
           <a:prstGeom prst="rect">
             <a:avLst/>
@@ -2409,7 +2301,85 @@
       </p:sp>
       <p:sp>
         <p:nvSpPr>
-          <p:cNvPr id="20" name="Shape 20"/>
+          <p:cNvPr id="22" name="Shape 22"/>
+          <p:cNvSpPr txBox="1"/>
+          <p:nvPr>
+            <p:ph idx="1" type="body"/>
+          </p:nvPr>
+        </p:nvSpPr>
+        <p:spPr>
+          <a:xfrm>
+            <a:off x="311700" y="1152475"/>
+            <a:ext cx="8520600" cy="3416400"/>
+          </a:xfrm>
+          <a:prstGeom prst="rect">
+            <a:avLst/>
+          </a:prstGeom>
+        </p:spPr>
+        <p:txBody>
+          <a:bodyPr anchorCtr="0" anchor="t" bIns="91425" lIns="91425" rIns="91425" tIns="91425"/>
+          <a:lstStyle>
+            <a:lvl1pPr lvl="0">
+              <a:spcBef>
+                <a:spcPts val="0"/>
+              </a:spcBef>
+              <a:defRPr/>
+            </a:lvl1pPr>
+            <a:lvl2pPr lvl="1">
+              <a:spcBef>
+                <a:spcPts val="0"/>
+              </a:spcBef>
+              <a:defRPr/>
+            </a:lvl2pPr>
+            <a:lvl3pPr lvl="2">
+              <a:spcBef>
+                <a:spcPts val="0"/>
+              </a:spcBef>
+              <a:defRPr/>
+            </a:lvl3pPr>
+            <a:lvl4pPr lvl="3">
+              <a:spcBef>
+                <a:spcPts val="0"/>
+              </a:spcBef>
+              <a:defRPr/>
+            </a:lvl4pPr>
+            <a:lvl5pPr lvl="4">
+              <a:spcBef>
+                <a:spcPts val="0"/>
+              </a:spcBef>
+              <a:defRPr/>
+            </a:lvl5pPr>
+            <a:lvl6pPr lvl="5">
+              <a:spcBef>
+                <a:spcPts val="0"/>
+              </a:spcBef>
+              <a:defRPr/>
+            </a:lvl6pPr>
+            <a:lvl7pPr lvl="6">
+              <a:spcBef>
+                <a:spcPts val="0"/>
+              </a:spcBef>
+              <a:defRPr/>
+            </a:lvl7pPr>
+            <a:lvl8pPr lvl="7">
+              <a:spcBef>
+                <a:spcPts val="0"/>
+              </a:spcBef>
+              <a:defRPr/>
+            </a:lvl8pPr>
+            <a:lvl9pPr lvl="8">
+              <a:spcBef>
+                <a:spcPts val="0"/>
+              </a:spcBef>
+              <a:defRPr/>
+            </a:lvl9pPr>
+          </a:lstStyle>
+          <a:p/>
+        </p:txBody>
+      </p:sp>
+      <p:sp>
+        <p:nvSpPr>
+          <p:cNvPr id="23" name="Shape 23"/>
           <p:cNvSpPr txBox="1"/>
           <p:nvPr>
             <p:ph idx="12" type="sldNum"/>
@@ -2417,7 +2387,7 @@
         </p:nvSpPr>
         <p:spPr>
           <a:xfrm>
-            <a:off x="8472457" y="4663216"/>
+            <a:off x="8490250" y="4681009"/>
             <a:ext cx="548700" cy="393600"/>
           </a:xfrm>
           <a:prstGeom prst="rect">
@@ -2456,7 +2426,7 @@
   <p:cSld name="Title and two columns">
     <p:spTree>
       <p:nvGrpSpPr>
-        <p:cNvPr id="21" name="Shape 21"/>
+        <p:cNvPr id="24" name="Shape 24"/>
         <p:cNvGrpSpPr/>
         <p:nvPr/>
       </p:nvGrpSpPr>
@@ -2470,7 +2440,7 @@
       </p:grpSpPr>
       <p:sp>
         <p:nvSpPr>
-          <p:cNvPr id="22" name="Shape 22"/>
+          <p:cNvPr id="25" name="Shape 25"/>
           <p:cNvSpPr txBox="1"/>
           <p:nvPr>
             <p:ph type="title"/>
@@ -2548,7 +2518,7 @@
       </p:sp>
       <p:sp>
         <p:nvSpPr>
-          <p:cNvPr id="23" name="Shape 23"/>
+          <p:cNvPr id="26" name="Shape 26"/>
           <p:cNvSpPr txBox="1"/>
           <p:nvPr>
             <p:ph idx="1" type="body"/>
@@ -2635,7 +2605,7 @@
       </p:sp>
       <p:sp>
         <p:nvSpPr>
-          <p:cNvPr id="24" name="Shape 24"/>
+          <p:cNvPr id="27" name="Shape 27"/>
           <p:cNvSpPr txBox="1"/>
           <p:nvPr>
             <p:ph idx="2" type="body"/>
@@ -2722,7 +2692,7 @@
       </p:sp>
       <p:sp>
         <p:nvSpPr>
-          <p:cNvPr id="25" name="Shape 25"/>
+          <p:cNvPr id="28" name="Shape 28"/>
           <p:cNvSpPr txBox="1"/>
           <p:nvPr>
             <p:ph idx="12" type="sldNum"/>
@@ -2730,7 +2700,7 @@
         </p:nvSpPr>
         <p:spPr>
           <a:xfrm>
-            <a:off x="8472457" y="4663216"/>
+            <a:off x="8490250" y="4681009"/>
             <a:ext cx="548700" cy="393600"/>
           </a:xfrm>
           <a:prstGeom prst="rect">
@@ -2769,7 +2739,7 @@
   <p:cSld name="Title only">
     <p:spTree>
       <p:nvGrpSpPr>
-        <p:cNvPr id="26" name="Shape 26"/>
+        <p:cNvPr id="29" name="Shape 29"/>
         <p:cNvGrpSpPr/>
         <p:nvPr/>
       </p:nvGrpSpPr>
@@ -2783,7 +2753,7 @@
       </p:grpSpPr>
       <p:sp>
         <p:nvSpPr>
-          <p:cNvPr id="27" name="Shape 27"/>
+          <p:cNvPr id="30" name="Shape 30"/>
           <p:cNvSpPr txBox="1"/>
           <p:nvPr>
             <p:ph type="title"/>
@@ -2861,7 +2831,7 @@
       </p:sp>
       <p:sp>
         <p:nvSpPr>
-          <p:cNvPr id="28" name="Shape 28"/>
+          <p:cNvPr id="31" name="Shape 31"/>
           <p:cNvSpPr txBox="1"/>
           <p:nvPr>
             <p:ph idx="12" type="sldNum"/>
@@ -2869,7 +2839,7 @@
         </p:nvSpPr>
         <p:spPr>
           <a:xfrm>
-            <a:off x="8472457" y="4663216"/>
+            <a:off x="8490250" y="4681009"/>
             <a:ext cx="548700" cy="393600"/>
           </a:xfrm>
           <a:prstGeom prst="rect">
@@ -2908,7 +2878,7 @@
   <p:cSld name="One column text">
     <p:spTree>
       <p:nvGrpSpPr>
-        <p:cNvPr id="29" name="Shape 29"/>
+        <p:cNvPr id="32" name="Shape 32"/>
         <p:cNvGrpSpPr/>
         <p:nvPr/>
       </p:nvGrpSpPr>
@@ -2922,7 +2892,7 @@
       </p:grpSpPr>
       <p:sp>
         <p:nvSpPr>
-          <p:cNvPr id="30" name="Shape 30"/>
+          <p:cNvPr id="33" name="Shape 33"/>
           <p:cNvSpPr txBox="1"/>
           <p:nvPr>
             <p:ph type="title"/>
@@ -2930,7 +2900,7 @@
         </p:nvSpPr>
         <p:spPr>
           <a:xfrm>
-            <a:off x="311700" y="631800"/>
+            <a:off x="311700" y="555600"/>
             <a:ext cx="2808000" cy="755700"/>
           </a:xfrm>
           <a:prstGeom prst="rect">
@@ -3009,7 +2979,7 @@
       </p:sp>
       <p:sp>
         <p:nvSpPr>
-          <p:cNvPr id="31" name="Shape 31"/>
+          <p:cNvPr id="34" name="Shape 34"/>
           <p:cNvSpPr txBox="1"/>
           <p:nvPr>
             <p:ph idx="1" type="body"/>
@@ -3017,8 +2987,8 @@
         </p:nvSpPr>
         <p:spPr>
           <a:xfrm>
-            <a:off x="311700" y="1490875"/>
-            <a:ext cx="2808000" cy="3078000"/>
+            <a:off x="311700" y="1389600"/>
+            <a:ext cx="2808000" cy="3179400"/>
           </a:xfrm>
           <a:prstGeom prst="rect">
             <a:avLst/>
@@ -3096,7 +3066,7 @@
       </p:sp>
       <p:sp>
         <p:nvSpPr>
-          <p:cNvPr id="32" name="Shape 32"/>
+          <p:cNvPr id="35" name="Shape 35"/>
           <p:cNvSpPr txBox="1"/>
           <p:nvPr>
             <p:ph idx="12" type="sldNum"/>
@@ -3104,7 +3074,7 @@
         </p:nvSpPr>
         <p:spPr>
           <a:xfrm>
-            <a:off x="8472457" y="4663216"/>
+            <a:off x="8490250" y="4681009"/>
             <a:ext cx="548700" cy="393600"/>
           </a:xfrm>
           <a:prstGeom prst="rect">
@@ -3144,13 +3114,13 @@
     <p:bg>
       <p:bgPr>
         <a:solidFill>
-          <a:schemeClr val="accent3"/>
+          <a:schemeClr val="lt2"/>
         </a:solidFill>
       </p:bgPr>
     </p:bg>
     <p:spTree>
       <p:nvGrpSpPr>
-        <p:cNvPr id="33" name="Shape 33"/>
+        <p:cNvPr id="36" name="Shape 36"/>
         <p:cNvGrpSpPr/>
         <p:nvPr/>
       </p:nvGrpSpPr>
@@ -3164,7 +3134,7 @@
       </p:grpSpPr>
       <p:sp>
         <p:nvSpPr>
-          <p:cNvPr id="34" name="Shape 34"/>
+          <p:cNvPr id="37" name="Shape 37"/>
           <p:cNvSpPr txBox="1"/>
           <p:nvPr>
             <p:ph type="title"/>
@@ -3173,7 +3143,7 @@
         <p:spPr>
           <a:xfrm>
             <a:off x="490250" y="526350"/>
-            <a:ext cx="5683800" cy="4090800"/>
+            <a:ext cx="6227100" cy="4090800"/>
           </a:xfrm>
           <a:prstGeom prst="rect">
             <a:avLst/>
@@ -3314,7 +3284,7 @@
       </p:sp>
       <p:sp>
         <p:nvSpPr>
-          <p:cNvPr id="35" name="Shape 35"/>
+          <p:cNvPr id="38" name="Shape 38"/>
           <p:cNvSpPr txBox="1"/>
           <p:nvPr>
             <p:ph idx="12" type="sldNum"/>
@@ -3322,7 +3292,7 @@
         </p:nvSpPr>
         <p:spPr>
           <a:xfrm>
-            <a:off x="8472457" y="4663216"/>
+            <a:off x="8490250" y="4681009"/>
             <a:ext cx="548700" cy="393600"/>
           </a:xfrm>
           <a:prstGeom prst="rect">
@@ -3365,7 +3335,7 @@
   <p:cSld name="Section title and description">
     <p:spTree>
       <p:nvGrpSpPr>
-        <p:cNvPr id="36" name="Shape 36"/>
+        <p:cNvPr id="39" name="Shape 39"/>
         <p:cNvGrpSpPr/>
         <p:nvPr/>
       </p:nvGrpSpPr>
@@ -3379,13 +3349,13 @@
       </p:grpSpPr>
       <p:sp>
         <p:nvSpPr>
-          <p:cNvPr id="37" name="Shape 37"/>
+          <p:cNvPr id="40" name="Shape 40"/>
           <p:cNvSpPr/>
           <p:nvPr/>
         </p:nvSpPr>
         <p:spPr>
           <a:xfrm>
-            <a:off x="4572000" y="100"/>
+            <a:off x="4572000" y="0"/>
             <a:ext cx="4572000" cy="5143500"/>
           </a:xfrm>
           <a:prstGeom prst="rect">
@@ -3419,7 +3389,7 @@
       </p:sp>
       <p:cxnSp>
         <p:nvCxnSpPr>
-          <p:cNvPr id="38" name="Shape 38"/>
+          <p:cNvPr id="41" name="Shape 41"/>
           <p:cNvCxnSpPr/>
           <p:nvPr/>
         </p:nvCxnSpPr>
@@ -3445,7 +3415,7 @@
       </p:cxnSp>
       <p:sp>
         <p:nvSpPr>
-          <p:cNvPr id="39" name="Shape 39"/>
+          <p:cNvPr id="42" name="Shape 42"/>
           <p:cNvSpPr txBox="1"/>
           <p:nvPr>
             <p:ph type="title"/>
@@ -3453,8 +3423,8 @@
         </p:nvSpPr>
         <p:spPr>
           <a:xfrm>
-            <a:off x="265500" y="1375599"/>
-            <a:ext cx="4045200" cy="1551900"/>
+            <a:off x="265500" y="1081400"/>
+            <a:ext cx="4045200" cy="1710300"/>
           </a:xfrm>
           <a:prstGeom prst="rect">
             <a:avLst/>
@@ -3468,63 +3438,63 @@
                 <a:spcPts val="0"/>
               </a:spcBef>
               <a:buSzPct val="100000"/>
-              <a:defRPr sz="3800"/>
+              <a:defRPr sz="4200"/>
             </a:lvl1pPr>
             <a:lvl2pPr lvl="1" algn="ctr">
               <a:spcBef>
                 <a:spcPts val="0"/>
               </a:spcBef>
               <a:buSzPct val="100000"/>
-              <a:defRPr sz="3800"/>
+              <a:defRPr sz="4200"/>
             </a:lvl2pPr>
             <a:lvl3pPr lvl="2" algn="ctr">
               <a:spcBef>
                 <a:spcPts val="0"/>
               </a:spcBef>
               <a:buSzPct val="100000"/>
-              <a:defRPr sz="3800"/>
+              <a:defRPr sz="4200"/>
             </a:lvl3pPr>
             <a:lvl4pPr lvl="3" algn="ctr">
               <a:spcBef>
                 <a:spcPts val="0"/>
               </a:spcBef>
               <a:buSzPct val="100000"/>
-              <a:defRPr sz="3800"/>
+              <a:defRPr sz="4200"/>
             </a:lvl4pPr>
             <a:lvl5pPr lvl="4" algn="ctr">
               <a:spcBef>
                 <a:spcPts val="0"/>
               </a:spcBef>
               <a:buSzPct val="100000"/>
-              <a:defRPr sz="3800"/>
+              <a:defRPr sz="4200"/>
             </a:lvl5pPr>
             <a:lvl6pPr lvl="5" algn="ctr">
               <a:spcBef>
                 <a:spcPts val="0"/>
               </a:spcBef>
               <a:buSzPct val="100000"/>
-              <a:defRPr sz="3800"/>
+              <a:defRPr sz="4200"/>
             </a:lvl6pPr>
             <a:lvl7pPr lvl="6" algn="ctr">
               <a:spcBef>
                 <a:spcPts val="0"/>
               </a:spcBef>
               <a:buSzPct val="100000"/>
-              <a:defRPr sz="3800"/>
+              <a:defRPr sz="4200"/>
             </a:lvl7pPr>
             <a:lvl8pPr lvl="7" algn="ctr">
               <a:spcBef>
                 <a:spcPts val="0"/>
               </a:spcBef>
               <a:buSzPct val="100000"/>
-              <a:defRPr sz="3800"/>
+              <a:defRPr sz="4200"/>
             </a:lvl8pPr>
             <a:lvl9pPr lvl="8" algn="ctr">
               <a:spcBef>
                 <a:spcPts val="0"/>
               </a:spcBef>
               <a:buSzPct val="100000"/>
-              <a:defRPr sz="3800"/>
+              <a:defRPr sz="4200"/>
             </a:lvl9pPr>
           </a:lstStyle>
           <a:p/>
@@ -3532,7 +3502,7 @@
       </p:sp>
       <p:sp>
         <p:nvSpPr>
-          <p:cNvPr id="40" name="Shape 40"/>
+          <p:cNvPr id="43" name="Shape 43"/>
           <p:cNvSpPr txBox="1"/>
           <p:nvPr>
             <p:ph idx="1" type="subTitle"/>
@@ -3540,8 +3510,8 @@
         </p:nvSpPr>
         <p:spPr>
           <a:xfrm>
-            <a:off x="265500" y="2981125"/>
-            <a:ext cx="4045200" cy="1345499"/>
+            <a:off x="265500" y="2845200"/>
+            <a:ext cx="4045200" cy="1345500"/>
           </a:xfrm>
           <a:prstGeom prst="rect">
             <a:avLst/>
@@ -3560,8 +3530,16 @@
               <a:spcAft>
                 <a:spcPts val="0"/>
               </a:spcAft>
+              <a:buClr>
+                <a:schemeClr val="dk1"/>
+              </a:buClr>
+              <a:buSzPct val="100000"/>
               <a:buNone/>
-              <a:defRPr/>
+              <a:defRPr sz="2100">
+                <a:solidFill>
+                  <a:schemeClr val="dk1"/>
+                </a:solidFill>
+              </a:defRPr>
             </a:lvl1pPr>
             <a:lvl2pPr lvl="1" algn="ctr">
               <a:lnSpc>
@@ -3573,9 +3551,16 @@
               <a:spcAft>
                 <a:spcPts val="0"/>
               </a:spcAft>
+              <a:buClr>
+                <a:schemeClr val="dk1"/>
+              </a:buClr>
               <a:buSzPct val="100000"/>
               <a:buNone/>
-              <a:defRPr sz="1800"/>
+              <a:defRPr sz="2100">
+                <a:solidFill>
+                  <a:schemeClr val="dk1"/>
+                </a:solidFill>
+              </a:defRPr>
             </a:lvl2pPr>
             <a:lvl3pPr lvl="2" algn="ctr">
               <a:lnSpc>
@@ -3587,9 +3572,16 @@
               <a:spcAft>
                 <a:spcPts val="0"/>
               </a:spcAft>
+              <a:buClr>
+                <a:schemeClr val="dk1"/>
+              </a:buClr>
               <a:buSzPct val="100000"/>
               <a:buNone/>
-              <a:defRPr sz="1800"/>
+              <a:defRPr sz="2100">
+                <a:solidFill>
+                  <a:schemeClr val="dk1"/>
+                </a:solidFill>
+              </a:defRPr>
             </a:lvl3pPr>
             <a:lvl4pPr lvl="3" algn="ctr">
               <a:lnSpc>
@@ -3601,9 +3593,16 @@
               <a:spcAft>
                 <a:spcPts val="0"/>
               </a:spcAft>
+              <a:buClr>
+                <a:schemeClr val="dk1"/>
+              </a:buClr>
               <a:buSzPct val="100000"/>
               <a:buNone/>
-              <a:defRPr sz="1800"/>
+              <a:defRPr sz="2100">
+                <a:solidFill>
+                  <a:schemeClr val="dk1"/>
+                </a:solidFill>
+              </a:defRPr>
             </a:lvl4pPr>
             <a:lvl5pPr lvl="4" algn="ctr">
               <a:lnSpc>
@@ -3615,9 +3614,16 @@
               <a:spcAft>
                 <a:spcPts val="0"/>
               </a:spcAft>
+              <a:buClr>
+                <a:schemeClr val="dk1"/>
+              </a:buClr>
               <a:buSzPct val="100000"/>
               <a:buNone/>
-              <a:defRPr sz="1800"/>
+              <a:defRPr sz="2100">
+                <a:solidFill>
+                  <a:schemeClr val="dk1"/>
+                </a:solidFill>
+              </a:defRPr>
             </a:lvl5pPr>
             <a:lvl6pPr lvl="5" algn="ctr">
               <a:lnSpc>
@@ -3629,9 +3635,16 @@
               <a:spcAft>
                 <a:spcPts val="0"/>
               </a:spcAft>
+              <a:buClr>
+                <a:schemeClr val="dk1"/>
+              </a:buClr>
               <a:buSzPct val="100000"/>
               <a:buNone/>
-              <a:defRPr sz="1800"/>
+              <a:defRPr sz="2100">
+                <a:solidFill>
+                  <a:schemeClr val="dk1"/>
+                </a:solidFill>
+              </a:defRPr>
             </a:lvl6pPr>
             <a:lvl7pPr lvl="6" algn="ctr">
               <a:lnSpc>
@@ -3643,9 +3656,16 @@
               <a:spcAft>
                 <a:spcPts val="0"/>
               </a:spcAft>
+              <a:buClr>
+                <a:schemeClr val="dk1"/>
+              </a:buClr>
               <a:buSzPct val="100000"/>
               <a:buNone/>
-              <a:defRPr sz="1800"/>
+              <a:defRPr sz="2100">
+                <a:solidFill>
+                  <a:schemeClr val="dk1"/>
+                </a:solidFill>
+              </a:defRPr>
             </a:lvl7pPr>
             <a:lvl8pPr lvl="7" algn="ctr">
               <a:lnSpc>
@@ -3657,9 +3677,16 @@
               <a:spcAft>
                 <a:spcPts val="0"/>
               </a:spcAft>
+              <a:buClr>
+                <a:schemeClr val="dk1"/>
+              </a:buClr>
               <a:buSzPct val="100000"/>
               <a:buNone/>
-              <a:defRPr sz="1800"/>
+              <a:defRPr sz="2100">
+                <a:solidFill>
+                  <a:schemeClr val="dk1"/>
+                </a:solidFill>
+              </a:defRPr>
             </a:lvl8pPr>
             <a:lvl9pPr lvl="8" algn="ctr">
               <a:lnSpc>
@@ -3671,9 +3698,16 @@
               <a:spcAft>
                 <a:spcPts val="0"/>
               </a:spcAft>
+              <a:buClr>
+                <a:schemeClr val="dk1"/>
+              </a:buClr>
               <a:buSzPct val="100000"/>
               <a:buNone/>
-              <a:defRPr sz="1800"/>
+              <a:defRPr sz="2100">
+                <a:solidFill>
+                  <a:schemeClr val="dk1"/>
+                </a:solidFill>
+              </a:defRPr>
             </a:lvl9pPr>
           </a:lstStyle>
           <a:p/>
@@ -3681,7 +3715,7 @@
       </p:sp>
       <p:sp>
         <p:nvSpPr>
-          <p:cNvPr id="41" name="Shape 41"/>
+          <p:cNvPr id="44" name="Shape 44"/>
           <p:cNvSpPr txBox="1"/>
           <p:nvPr>
             <p:ph idx="2" type="body"/>
@@ -3822,7 +3856,7 @@
       </p:sp>
       <p:sp>
         <p:nvSpPr>
-          <p:cNvPr id="42" name="Shape 42"/>
+          <p:cNvPr id="45" name="Shape 45"/>
           <p:cNvSpPr txBox="1"/>
           <p:nvPr>
             <p:ph idx="12" type="sldNum"/>
@@ -3830,7 +3864,7 @@
         </p:nvSpPr>
         <p:spPr>
           <a:xfrm>
-            <a:off x="8472457" y="4663216"/>
+            <a:off x="8490250" y="4681009"/>
             <a:ext cx="548700" cy="393600"/>
           </a:xfrm>
           <a:prstGeom prst="rect">
@@ -3873,7 +3907,7 @@
   <p:cSld name="Caption">
     <p:spTree>
       <p:nvGrpSpPr>
-        <p:cNvPr id="43" name="Shape 43"/>
+        <p:cNvPr id="46" name="Shape 46"/>
         <p:cNvGrpSpPr/>
         <p:nvPr/>
       </p:nvGrpSpPr>
@@ -3887,7 +3921,7 @@
       </p:grpSpPr>
       <p:sp>
         <p:nvSpPr>
-          <p:cNvPr id="44" name="Shape 44"/>
+          <p:cNvPr id="47" name="Shape 47"/>
           <p:cNvSpPr txBox="1"/>
           <p:nvPr>
             <p:ph idx="1" type="body"/>
@@ -3895,8 +3929,8 @@
         </p:nvSpPr>
         <p:spPr>
           <a:xfrm>
-            <a:off x="319500" y="4233725"/>
-            <a:ext cx="5998800" cy="598800"/>
+            <a:off x="311700" y="4230575"/>
+            <a:ext cx="5998800" cy="605100"/>
           </a:xfrm>
           <a:prstGeom prst="rect">
             <a:avLst/>
@@ -3916,18 +3950,19 @@
                 <a:spcPts val="0"/>
               </a:spcAft>
               <a:buClr>
-                <a:schemeClr val="accent3"/>
+                <a:schemeClr val="dk1"/>
               </a:buClr>
-              <a:buFont typeface="Alfa Slab One"/>
+              <a:buSzPct val="100000"/>
+              <a:buFont typeface="Oswald"/>
               <a:buNone/>
-              <a:defRPr>
+              <a:defRPr sz="2100">
                 <a:solidFill>
-                  <a:schemeClr val="accent3"/>
+                  <a:schemeClr val="dk1"/>
                 </a:solidFill>
-                <a:latin typeface="Alfa Slab One"/>
-                <a:ea typeface="Alfa Slab One"/>
-                <a:cs typeface="Alfa Slab One"/>
-                <a:sym typeface="Alfa Slab One"/>
+                <a:latin typeface="Oswald"/>
+                <a:ea typeface="Oswald"/>
+                <a:cs typeface="Oswald"/>
+                <a:sym typeface="Oswald"/>
               </a:defRPr>
             </a:lvl1pPr>
           </a:lstStyle>
@@ -3936,7 +3971,7 @@
       </p:sp>
       <p:sp>
         <p:nvSpPr>
-          <p:cNvPr id="45" name="Shape 45"/>
+          <p:cNvPr id="48" name="Shape 48"/>
           <p:cNvSpPr txBox="1"/>
           <p:nvPr>
             <p:ph idx="12" type="sldNum"/>
@@ -3944,7 +3979,7 @@
         </p:nvSpPr>
         <p:spPr>
           <a:xfrm>
-            <a:off x="8472457" y="4663216"/>
+            <a:off x="8490250" y="4681009"/>
             <a:ext cx="548700" cy="393600"/>
           </a:xfrm>
           <a:prstGeom prst="rect">
@@ -4031,19 +4066,19 @@
                 <a:spcPts val="0"/>
               </a:spcBef>
               <a:buClr>
-                <a:schemeClr val="accent3"/>
+                <a:schemeClr val="dk1"/>
               </a:buClr>
               <a:buSzPct val="100000"/>
-              <a:buFont typeface="Alfa Slab One"/>
+              <a:buFont typeface="Oswald"/>
               <a:buNone/>
               <a:defRPr sz="3000">
                 <a:solidFill>
-                  <a:schemeClr val="accent3"/>
+                  <a:schemeClr val="dk1"/>
                 </a:solidFill>
-                <a:latin typeface="Alfa Slab One"/>
-                <a:ea typeface="Alfa Slab One"/>
-                <a:cs typeface="Alfa Slab One"/>
-                <a:sym typeface="Alfa Slab One"/>
+                <a:latin typeface="Oswald"/>
+                <a:ea typeface="Oswald"/>
+                <a:cs typeface="Oswald"/>
+                <a:sym typeface="Oswald"/>
               </a:defRPr>
             </a:lvl1pPr>
             <a:lvl2pPr lvl="1">
@@ -4051,19 +4086,19 @@
                 <a:spcPts val="0"/>
               </a:spcBef>
               <a:buClr>
-                <a:schemeClr val="accent3"/>
+                <a:schemeClr val="dk1"/>
               </a:buClr>
               <a:buSzPct val="100000"/>
-              <a:buFont typeface="Alfa Slab One"/>
+              <a:buFont typeface="Oswald"/>
               <a:buNone/>
               <a:defRPr sz="3000">
                 <a:solidFill>
-                  <a:schemeClr val="accent3"/>
+                  <a:schemeClr val="dk1"/>
                 </a:solidFill>
-                <a:latin typeface="Alfa Slab One"/>
-                <a:ea typeface="Alfa Slab One"/>
-                <a:cs typeface="Alfa Slab One"/>
-                <a:sym typeface="Alfa Slab One"/>
+                <a:latin typeface="Oswald"/>
+                <a:ea typeface="Oswald"/>
+                <a:cs typeface="Oswald"/>
+                <a:sym typeface="Oswald"/>
               </a:defRPr>
             </a:lvl2pPr>
             <a:lvl3pPr lvl="2">
@@ -4071,19 +4106,19 @@
                 <a:spcPts val="0"/>
               </a:spcBef>
               <a:buClr>
-                <a:schemeClr val="accent3"/>
+                <a:schemeClr val="dk1"/>
               </a:buClr>
               <a:buSzPct val="100000"/>
-              <a:buFont typeface="Alfa Slab One"/>
+              <a:buFont typeface="Oswald"/>
               <a:buNone/>
               <a:defRPr sz="3000">
                 <a:solidFill>
-                  <a:schemeClr val="accent3"/>
+                  <a:schemeClr val="dk1"/>
                 </a:solidFill>
-                <a:latin typeface="Alfa Slab One"/>
-                <a:ea typeface="Alfa Slab One"/>
-                <a:cs typeface="Alfa Slab One"/>
-                <a:sym typeface="Alfa Slab One"/>
+                <a:latin typeface="Oswald"/>
+                <a:ea typeface="Oswald"/>
+                <a:cs typeface="Oswald"/>
+                <a:sym typeface="Oswald"/>
               </a:defRPr>
             </a:lvl3pPr>
             <a:lvl4pPr lvl="3">
@@ -4091,19 +4126,19 @@
                 <a:spcPts val="0"/>
               </a:spcBef>
               <a:buClr>
-                <a:schemeClr val="accent3"/>
+                <a:schemeClr val="dk1"/>
               </a:buClr>
               <a:buSzPct val="100000"/>
-              <a:buFont typeface="Alfa Slab One"/>
+              <a:buFont typeface="Oswald"/>
               <a:buNone/>
               <a:defRPr sz="3000">
                 <a:solidFill>
-                  <a:schemeClr val="accent3"/>
+                  <a:schemeClr val="dk1"/>
                 </a:solidFill>
-                <a:latin typeface="Alfa Slab One"/>
-                <a:ea typeface="Alfa Slab One"/>
-                <a:cs typeface="Alfa Slab One"/>
-                <a:sym typeface="Alfa Slab One"/>
+                <a:latin typeface="Oswald"/>
+                <a:ea typeface="Oswald"/>
+                <a:cs typeface="Oswald"/>
+                <a:sym typeface="Oswald"/>
               </a:defRPr>
             </a:lvl4pPr>
             <a:lvl5pPr lvl="4">
@@ -4111,19 +4146,19 @@
                 <a:spcPts val="0"/>
               </a:spcBef>
               <a:buClr>
-                <a:schemeClr val="accent3"/>
+                <a:schemeClr val="dk1"/>
               </a:buClr>
               <a:buSzPct val="100000"/>
-              <a:buFont typeface="Alfa Slab One"/>
+              <a:buFont typeface="Oswald"/>
               <a:buNone/>
               <a:defRPr sz="3000">
                 <a:solidFill>
-                  <a:schemeClr val="accent3"/>
+                  <a:schemeClr val="dk1"/>
                 </a:solidFill>
-                <a:latin typeface="Alfa Slab One"/>
-                <a:ea typeface="Alfa Slab One"/>
-                <a:cs typeface="Alfa Slab One"/>
-                <a:sym typeface="Alfa Slab One"/>
+                <a:latin typeface="Oswald"/>
+                <a:ea typeface="Oswald"/>
+                <a:cs typeface="Oswald"/>
+                <a:sym typeface="Oswald"/>
               </a:defRPr>
             </a:lvl5pPr>
             <a:lvl6pPr lvl="5">
@@ -4131,19 +4166,19 @@
                 <a:spcPts val="0"/>
               </a:spcBef>
               <a:buClr>
-                <a:schemeClr val="accent3"/>
+                <a:schemeClr val="dk1"/>
               </a:buClr>
               <a:buSzPct val="100000"/>
-              <a:buFont typeface="Alfa Slab One"/>
+              <a:buFont typeface="Oswald"/>
               <a:buNone/>
               <a:defRPr sz="3000">
                 <a:solidFill>
-                  <a:schemeClr val="accent3"/>
+                  <a:schemeClr val="dk1"/>
                 </a:solidFill>
-                <a:latin typeface="Alfa Slab One"/>
-                <a:ea typeface="Alfa Slab One"/>
-                <a:cs typeface="Alfa Slab One"/>
-                <a:sym typeface="Alfa Slab One"/>
+                <a:latin typeface="Oswald"/>
+                <a:ea typeface="Oswald"/>
+                <a:cs typeface="Oswald"/>
+                <a:sym typeface="Oswald"/>
               </a:defRPr>
             </a:lvl6pPr>
             <a:lvl7pPr lvl="6">
@@ -4151,19 +4186,19 @@
                 <a:spcPts val="0"/>
               </a:spcBef>
               <a:buClr>
-                <a:schemeClr val="accent3"/>
+                <a:schemeClr val="dk1"/>
               </a:buClr>
               <a:buSzPct val="100000"/>
-              <a:buFont typeface="Alfa Slab One"/>
+              <a:buFont typeface="Oswald"/>
               <a:buNone/>
               <a:defRPr sz="3000">
                 <a:solidFill>
-                  <a:schemeClr val="accent3"/>
+                  <a:schemeClr val="dk1"/>
                 </a:solidFill>
-                <a:latin typeface="Alfa Slab One"/>
-                <a:ea typeface="Alfa Slab One"/>
-                <a:cs typeface="Alfa Slab One"/>
-                <a:sym typeface="Alfa Slab One"/>
+                <a:latin typeface="Oswald"/>
+                <a:ea typeface="Oswald"/>
+                <a:cs typeface="Oswald"/>
+                <a:sym typeface="Oswald"/>
               </a:defRPr>
             </a:lvl7pPr>
             <a:lvl8pPr lvl="7">
@@ -4171,19 +4206,19 @@
                 <a:spcPts val="0"/>
               </a:spcBef>
               <a:buClr>
-                <a:schemeClr val="accent3"/>
+                <a:schemeClr val="dk1"/>
               </a:buClr>
               <a:buSzPct val="100000"/>
-              <a:buFont typeface="Alfa Slab One"/>
+              <a:buFont typeface="Oswald"/>
               <a:buNone/>
               <a:defRPr sz="3000">
                 <a:solidFill>
-                  <a:schemeClr val="accent3"/>
+                  <a:schemeClr val="dk1"/>
                 </a:solidFill>
-                <a:latin typeface="Alfa Slab One"/>
-                <a:ea typeface="Alfa Slab One"/>
-                <a:cs typeface="Alfa Slab One"/>
-                <a:sym typeface="Alfa Slab One"/>
+                <a:latin typeface="Oswald"/>
+                <a:ea typeface="Oswald"/>
+                <a:cs typeface="Oswald"/>
+                <a:sym typeface="Oswald"/>
               </a:defRPr>
             </a:lvl8pPr>
             <a:lvl9pPr lvl="8">
@@ -4191,19 +4226,19 @@
                 <a:spcPts val="0"/>
               </a:spcBef>
               <a:buClr>
-                <a:schemeClr val="accent3"/>
+                <a:schemeClr val="dk1"/>
               </a:buClr>
               <a:buSzPct val="100000"/>
-              <a:buFont typeface="Alfa Slab One"/>
+              <a:buFont typeface="Oswald"/>
               <a:buNone/>
               <a:defRPr sz="3000">
                 <a:solidFill>
-                  <a:schemeClr val="accent3"/>
+                  <a:schemeClr val="dk1"/>
                 </a:solidFill>
-                <a:latin typeface="Alfa Slab One"/>
-                <a:ea typeface="Alfa Slab One"/>
-                <a:cs typeface="Alfa Slab One"/>
-                <a:sym typeface="Alfa Slab One"/>
+                <a:latin typeface="Oswald"/>
+                <a:ea typeface="Oswald"/>
+                <a:cs typeface="Oswald"/>
+                <a:sym typeface="Oswald"/>
               </a:defRPr>
             </a:lvl9pPr>
           </a:lstStyle>
@@ -4245,18 +4280,18 @@
                 <a:spcPts val="1600"/>
               </a:spcAft>
               <a:buClr>
-                <a:schemeClr val="dk2"/>
+                <a:schemeClr val="accent3"/>
               </a:buClr>
               <a:buSzPct val="100000"/>
-              <a:buFont typeface="Proxima Nova"/>
+              <a:buFont typeface="Average"/>
               <a:defRPr sz="1800">
                 <a:solidFill>
-                  <a:schemeClr val="dk2"/>
+                  <a:schemeClr val="accent3"/>
                 </a:solidFill>
-                <a:latin typeface="Proxima Nova"/>
-                <a:ea typeface="Proxima Nova"/>
-                <a:cs typeface="Proxima Nova"/>
-                <a:sym typeface="Proxima Nova"/>
+                <a:latin typeface="Average"/>
+                <a:ea typeface="Average"/>
+                <a:cs typeface="Average"/>
+                <a:sym typeface="Average"/>
               </a:defRPr>
             </a:lvl1pPr>
             <a:lvl2pPr lvl="1">
@@ -4270,17 +4305,17 @@
                 <a:spcPts val="1600"/>
               </a:spcAft>
               <a:buClr>
-                <a:schemeClr val="dk2"/>
+                <a:schemeClr val="accent3"/>
               </a:buClr>
-              <a:buFont typeface="Proxima Nova"/>
+              <a:buFont typeface="Average"/>
               <a:defRPr>
                 <a:solidFill>
-                  <a:schemeClr val="dk2"/>
+                  <a:schemeClr val="accent3"/>
                 </a:solidFill>
-                <a:latin typeface="Proxima Nova"/>
-                <a:ea typeface="Proxima Nova"/>
-                <a:cs typeface="Proxima Nova"/>
-                <a:sym typeface="Proxima Nova"/>
+                <a:latin typeface="Average"/>
+                <a:ea typeface="Average"/>
+                <a:cs typeface="Average"/>
+                <a:sym typeface="Average"/>
               </a:defRPr>
             </a:lvl2pPr>
             <a:lvl3pPr lvl="2">
@@ -4294,17 +4329,17 @@
                 <a:spcPts val="1600"/>
               </a:spcAft>
               <a:buClr>
-                <a:schemeClr val="dk2"/>
+                <a:schemeClr val="accent3"/>
               </a:buClr>
-              <a:buFont typeface="Proxima Nova"/>
+              <a:buFont typeface="Average"/>
               <a:defRPr>
                 <a:solidFill>
-                  <a:schemeClr val="dk2"/>
+                  <a:schemeClr val="accent3"/>
                 </a:solidFill>
-                <a:latin typeface="Proxima Nova"/>
-                <a:ea typeface="Proxima Nova"/>
-                <a:cs typeface="Proxima Nova"/>
-                <a:sym typeface="Proxima Nova"/>
+                <a:latin typeface="Average"/>
+                <a:ea typeface="Average"/>
+                <a:cs typeface="Average"/>
+                <a:sym typeface="Average"/>
               </a:defRPr>
             </a:lvl3pPr>
             <a:lvl4pPr lvl="3">
@@ -4318,17 +4353,17 @@
                 <a:spcPts val="1600"/>
               </a:spcAft>
               <a:buClr>
-                <a:schemeClr val="dk2"/>
+                <a:schemeClr val="accent3"/>
               </a:buClr>
-              <a:buFont typeface="Proxima Nova"/>
+              <a:buFont typeface="Average"/>
               <a:defRPr>
                 <a:solidFill>
-                  <a:schemeClr val="dk2"/>
+                  <a:schemeClr val="accent3"/>
                 </a:solidFill>
-                <a:latin typeface="Proxima Nova"/>
-                <a:ea typeface="Proxima Nova"/>
-                <a:cs typeface="Proxima Nova"/>
-                <a:sym typeface="Proxima Nova"/>
+                <a:latin typeface="Average"/>
+                <a:ea typeface="Average"/>
+                <a:cs typeface="Average"/>
+                <a:sym typeface="Average"/>
               </a:defRPr>
             </a:lvl4pPr>
             <a:lvl5pPr lvl="4">
@@ -4342,17 +4377,17 @@
                 <a:spcPts val="1600"/>
               </a:spcAft>
               <a:buClr>
-                <a:schemeClr val="dk2"/>
+                <a:schemeClr val="accent3"/>
               </a:buClr>
-              <a:buFont typeface="Proxima Nova"/>
+              <a:buFont typeface="Average"/>
               <a:defRPr>
                 <a:solidFill>
-                  <a:schemeClr val="dk2"/>
+                  <a:schemeClr val="accent3"/>
                 </a:solidFill>
-                <a:latin typeface="Proxima Nova"/>
-                <a:ea typeface="Proxima Nova"/>
-                <a:cs typeface="Proxima Nova"/>
-                <a:sym typeface="Proxima Nova"/>
+                <a:latin typeface="Average"/>
+                <a:ea typeface="Average"/>
+                <a:cs typeface="Average"/>
+                <a:sym typeface="Average"/>
               </a:defRPr>
             </a:lvl5pPr>
             <a:lvl6pPr lvl="5">
@@ -4366,17 +4401,17 @@
                 <a:spcPts val="1600"/>
               </a:spcAft>
               <a:buClr>
-                <a:schemeClr val="dk2"/>
+                <a:schemeClr val="accent3"/>
               </a:buClr>
-              <a:buFont typeface="Proxima Nova"/>
+              <a:buFont typeface="Average"/>
               <a:defRPr>
                 <a:solidFill>
-                  <a:schemeClr val="dk2"/>
+                  <a:schemeClr val="accent3"/>
                 </a:solidFill>
-                <a:latin typeface="Proxima Nova"/>
-                <a:ea typeface="Proxima Nova"/>
-                <a:cs typeface="Proxima Nova"/>
-                <a:sym typeface="Proxima Nova"/>
+                <a:latin typeface="Average"/>
+                <a:ea typeface="Average"/>
+                <a:cs typeface="Average"/>
+                <a:sym typeface="Average"/>
               </a:defRPr>
             </a:lvl6pPr>
             <a:lvl7pPr lvl="6">
@@ -4390,17 +4425,17 @@
                 <a:spcPts val="1600"/>
               </a:spcAft>
               <a:buClr>
-                <a:schemeClr val="dk2"/>
+                <a:schemeClr val="accent3"/>
               </a:buClr>
-              <a:buFont typeface="Proxima Nova"/>
+              <a:buFont typeface="Average"/>
               <a:defRPr>
                 <a:solidFill>
-                  <a:schemeClr val="dk2"/>
+                  <a:schemeClr val="accent3"/>
                 </a:solidFill>
-                <a:latin typeface="Proxima Nova"/>
-                <a:ea typeface="Proxima Nova"/>
-                <a:cs typeface="Proxima Nova"/>
-                <a:sym typeface="Proxima Nova"/>
+                <a:latin typeface="Average"/>
+                <a:ea typeface="Average"/>
+                <a:cs typeface="Average"/>
+                <a:sym typeface="Average"/>
               </a:defRPr>
             </a:lvl7pPr>
             <a:lvl8pPr lvl="7">
@@ -4414,17 +4449,17 @@
                 <a:spcPts val="1600"/>
               </a:spcAft>
               <a:buClr>
-                <a:schemeClr val="dk2"/>
+                <a:schemeClr val="accent3"/>
               </a:buClr>
-              <a:buFont typeface="Proxima Nova"/>
+              <a:buFont typeface="Average"/>
               <a:defRPr>
                 <a:solidFill>
-                  <a:schemeClr val="dk2"/>
+                  <a:schemeClr val="accent3"/>
                 </a:solidFill>
-                <a:latin typeface="Proxima Nova"/>
-                <a:ea typeface="Proxima Nova"/>
-                <a:cs typeface="Proxima Nova"/>
-                <a:sym typeface="Proxima Nova"/>
+                <a:latin typeface="Average"/>
+                <a:ea typeface="Average"/>
+                <a:cs typeface="Average"/>
+                <a:sym typeface="Average"/>
               </a:defRPr>
             </a:lvl8pPr>
             <a:lvl9pPr lvl="8">
@@ -4438,17 +4473,17 @@
                 <a:spcPts val="1600"/>
               </a:spcAft>
               <a:buClr>
-                <a:schemeClr val="dk2"/>
+                <a:schemeClr val="accent3"/>
               </a:buClr>
-              <a:buFont typeface="Proxima Nova"/>
+              <a:buFont typeface="Average"/>
               <a:defRPr>
                 <a:solidFill>
-                  <a:schemeClr val="dk2"/>
+                  <a:schemeClr val="accent3"/>
                 </a:solidFill>
-                <a:latin typeface="Proxima Nova"/>
-                <a:ea typeface="Proxima Nova"/>
-                <a:cs typeface="Proxima Nova"/>
-                <a:sym typeface="Proxima Nova"/>
+                <a:latin typeface="Average"/>
+                <a:ea typeface="Average"/>
+                <a:cs typeface="Average"/>
+                <a:sym typeface="Average"/>
               </a:defRPr>
             </a:lvl9pPr>
           </a:lstStyle>
@@ -4465,7 +4500,7 @@
         </p:nvSpPr>
         <p:spPr>
           <a:xfrm>
-            <a:off x="8472457" y="4663216"/>
+            <a:off x="8490250" y="4681009"/>
             <a:ext cx="548700" cy="393600"/>
           </a:xfrm>
           <a:prstGeom prst="rect">
@@ -4491,12 +4526,12 @@
             <a:fld id="{00000000-1234-1234-1234-123412341234}" type="slidenum">
               <a:rPr lang="en" sz="1000">
                 <a:solidFill>
-                  <a:schemeClr val="dk2"/>
+                  <a:schemeClr val="accent3"/>
                 </a:solidFill>
-                <a:latin typeface="Proxima Nova"/>
-                <a:ea typeface="Proxima Nova"/>
-                <a:cs typeface="Proxima Nova"/>
-                <a:sym typeface="Proxima Nova"/>
+                <a:latin typeface="Average"/>
+                <a:ea typeface="Average"/>
+                <a:cs typeface="Average"/>
+                <a:sym typeface="Average"/>
               </a:rPr>
               <a:t>‹#›</a:t>
             </a:fld>
@@ -4968,7 +5003,7 @@
   <p:cSld>
     <p:spTree>
       <p:nvGrpSpPr>
-        <p:cNvPr id="55" name="Shape 55"/>
+        <p:cNvPr id="58" name="Shape 58"/>
         <p:cNvGrpSpPr/>
         <p:nvPr/>
       </p:nvGrpSpPr>
@@ -4982,7 +5017,7 @@
       </p:grpSpPr>
       <p:sp>
         <p:nvSpPr>
-          <p:cNvPr id="56" name="Shape 56"/>
+          <p:cNvPr id="59" name="Shape 59"/>
           <p:cNvSpPr txBox="1"/>
           <p:nvPr>
             <p:ph type="ctrTitle"/>
@@ -4990,8 +5025,8 @@
         </p:nvSpPr>
         <p:spPr>
           <a:xfrm>
-            <a:off x="311700" y="595975"/>
-            <a:ext cx="8520600" cy="1957800"/>
+            <a:off x="671257" y="990800"/>
+            <a:ext cx="7801500" cy="1730100"/>
           </a:xfrm>
           <a:prstGeom prst="rect">
             <a:avLst/>
@@ -5011,14 +5046,14 @@
             </a:pPr>
             <a:r>
               <a:rPr lang="en"/>
-              <a:t>To-Do List Android Project</a:t>
+              <a:t>To-Do List - Android Project</a:t>
             </a:r>
           </a:p>
         </p:txBody>
       </p:sp>
       <p:sp>
         <p:nvSpPr>
-          <p:cNvPr id="57" name="Shape 57"/>
+          <p:cNvPr id="60" name="Shape 60"/>
           <p:cNvSpPr txBox="1"/>
           <p:nvPr>
             <p:ph idx="1" type="subTitle"/>
@@ -5026,8 +5061,8 @@
         </p:nvSpPr>
         <p:spPr>
           <a:xfrm>
-            <a:off x="311700" y="3165823"/>
-            <a:ext cx="8520600" cy="733500"/>
+            <a:off x="671250" y="3174875"/>
+            <a:ext cx="7801500" cy="792600"/>
           </a:xfrm>
           <a:prstGeom prst="rect">
             <a:avLst/>
@@ -5065,7 +5100,7 @@
   <p:cSld>
     <p:spTree>
       <p:nvGrpSpPr>
-        <p:cNvPr id="113" name="Shape 113"/>
+        <p:cNvPr id="116" name="Shape 116"/>
         <p:cNvGrpSpPr/>
         <p:nvPr/>
       </p:nvGrpSpPr>
@@ -5079,7 +5114,7 @@
       </p:grpSpPr>
       <p:sp>
         <p:nvSpPr>
-          <p:cNvPr id="114" name="Shape 114"/>
+          <p:cNvPr id="117" name="Shape 117"/>
           <p:cNvSpPr txBox="1"/>
           <p:nvPr>
             <p:ph type="title"/>
@@ -5115,7 +5150,7 @@
       </p:sp>
       <p:sp>
         <p:nvSpPr>
-          <p:cNvPr id="115" name="Shape 115"/>
+          <p:cNvPr id="118" name="Shape 118"/>
           <p:cNvSpPr txBox="1"/>
           <p:nvPr>
             <p:ph idx="1" type="body"/>
@@ -5198,7 +5233,7 @@
   <p:cSld>
     <p:spTree>
       <p:nvGrpSpPr>
-        <p:cNvPr id="61" name="Shape 61"/>
+        <p:cNvPr id="64" name="Shape 64"/>
         <p:cNvGrpSpPr/>
         <p:nvPr/>
       </p:nvGrpSpPr>
@@ -5212,7 +5247,7 @@
       </p:grpSpPr>
       <p:sp>
         <p:nvSpPr>
-          <p:cNvPr id="62" name="Shape 62"/>
+          <p:cNvPr id="65" name="Shape 65"/>
           <p:cNvSpPr txBox="1"/>
           <p:nvPr>
             <p:ph type="title"/>
@@ -5248,7 +5283,7 @@
       </p:sp>
       <p:pic>
         <p:nvPicPr>
-          <p:cNvPr descr="MVP Requirements.png" id="63" name="Shape 63"/>
+          <p:cNvPr descr="MVP Requirements.png" id="66" name="Shape 66"/>
           <p:cNvPicPr preferRelativeResize="0"/>
           <p:nvPr/>
         </p:nvPicPr>
@@ -5287,7 +5322,7 @@
   <p:cSld>
     <p:spTree>
       <p:nvGrpSpPr>
-        <p:cNvPr id="67" name="Shape 67"/>
+        <p:cNvPr id="70" name="Shape 70"/>
         <p:cNvGrpSpPr/>
         <p:nvPr/>
       </p:nvGrpSpPr>
@@ -5301,7 +5336,7 @@
       </p:grpSpPr>
       <p:sp>
         <p:nvSpPr>
-          <p:cNvPr id="68" name="Shape 68"/>
+          <p:cNvPr id="71" name="Shape 71"/>
           <p:cNvSpPr txBox="1"/>
           <p:nvPr>
             <p:ph type="title"/>
@@ -5337,7 +5372,7 @@
       </p:sp>
       <p:pic>
         <p:nvPicPr>
-          <p:cNvPr descr="Trello Plan.png" id="69" name="Shape 69"/>
+          <p:cNvPr descr="Trello Plan.png" id="72" name="Shape 72"/>
           <p:cNvPicPr preferRelativeResize="0"/>
           <p:nvPr/>
         </p:nvPicPr>
@@ -5376,7 +5411,7 @@
   <p:cSld>
     <p:spTree>
       <p:nvGrpSpPr>
-        <p:cNvPr id="73" name="Shape 73"/>
+        <p:cNvPr id="76" name="Shape 76"/>
         <p:cNvGrpSpPr/>
         <p:nvPr/>
       </p:nvGrpSpPr>
@@ -5390,7 +5425,7 @@
       </p:grpSpPr>
       <p:sp>
         <p:nvSpPr>
-          <p:cNvPr id="74" name="Shape 74"/>
+          <p:cNvPr id="77" name="Shape 77"/>
           <p:cNvSpPr txBox="1"/>
           <p:nvPr>
             <p:ph type="title"/>
@@ -5426,7 +5461,7 @@
       </p:sp>
       <p:pic>
         <p:nvPicPr>
-          <p:cNvPr descr="Use Diagram.png" id="75" name="Shape 75"/>
+          <p:cNvPr descr="Use Diagram.png" id="78" name="Shape 78"/>
           <p:cNvPicPr preferRelativeResize="0"/>
           <p:nvPr/>
         </p:nvPicPr>
@@ -5465,7 +5500,7 @@
   <p:cSld>
     <p:spTree>
       <p:nvGrpSpPr>
-        <p:cNvPr id="79" name="Shape 79"/>
+        <p:cNvPr id="82" name="Shape 82"/>
         <p:cNvGrpSpPr/>
         <p:nvPr/>
       </p:nvGrpSpPr>
@@ -5479,7 +5514,7 @@
       </p:grpSpPr>
       <p:sp>
         <p:nvSpPr>
-          <p:cNvPr id="80" name="Shape 80"/>
+          <p:cNvPr id="83" name="Shape 83"/>
           <p:cNvSpPr txBox="1"/>
           <p:nvPr>
             <p:ph type="title"/>
@@ -5515,7 +5550,7 @@
       </p:sp>
       <p:pic>
         <p:nvPicPr>
-          <p:cNvPr descr="Class Diagram.png" id="81" name="Shape 81"/>
+          <p:cNvPr descr="Class Diagram.png" id="84" name="Shape 84"/>
           <p:cNvPicPr preferRelativeResize="0"/>
           <p:nvPr/>
         </p:nvPicPr>
@@ -5554,7 +5589,7 @@
   <p:cSld>
     <p:spTree>
       <p:nvGrpSpPr>
-        <p:cNvPr id="85" name="Shape 85"/>
+        <p:cNvPr id="88" name="Shape 88"/>
         <p:cNvGrpSpPr/>
         <p:nvPr/>
       </p:nvGrpSpPr>
@@ -5568,7 +5603,7 @@
       </p:grpSpPr>
       <p:sp>
         <p:nvSpPr>
-          <p:cNvPr id="86" name="Shape 86"/>
+          <p:cNvPr id="89" name="Shape 89"/>
           <p:cNvSpPr txBox="1"/>
           <p:nvPr>
             <p:ph type="title"/>
@@ -5604,7 +5639,7 @@
       </p:sp>
       <p:pic>
         <p:nvPicPr>
-          <p:cNvPr descr="Object Diagram.png" id="87" name="Shape 87"/>
+          <p:cNvPr descr="Object Diagram.png" id="90" name="Shape 90"/>
           <p:cNvPicPr preferRelativeResize="0"/>
           <p:nvPr/>
         </p:nvPicPr>
@@ -5643,7 +5678,7 @@
   <p:cSld>
     <p:spTree>
       <p:nvGrpSpPr>
-        <p:cNvPr id="91" name="Shape 91"/>
+        <p:cNvPr id="94" name="Shape 94"/>
         <p:cNvGrpSpPr/>
         <p:nvPr/>
       </p:nvGrpSpPr>
@@ -5657,7 +5692,7 @@
       </p:grpSpPr>
       <p:sp>
         <p:nvSpPr>
-          <p:cNvPr id="92" name="Shape 92"/>
+          <p:cNvPr id="95" name="Shape 95"/>
           <p:cNvSpPr txBox="1"/>
           <p:nvPr>
             <p:ph type="title"/>
@@ -5693,7 +5728,7 @@
       </p:sp>
       <p:pic>
         <p:nvPicPr>
-          <p:cNvPr descr="Main Screen Mockup.png" id="93" name="Shape 93"/>
+          <p:cNvPr descr="Main Screen Mockup.png" id="96" name="Shape 96"/>
           <p:cNvPicPr preferRelativeResize="0"/>
           <p:nvPr/>
         </p:nvPicPr>
@@ -5721,7 +5756,7 @@
       </p:pic>
       <p:pic>
         <p:nvPicPr>
-          <p:cNvPr descr="Individual List Screen Mockup.png" id="94" name="Shape 94"/>
+          <p:cNvPr descr="Individual List Screen Mockup.png" id="97" name="Shape 97"/>
           <p:cNvPicPr preferRelativeResize="0"/>
           <p:nvPr/>
         </p:nvPicPr>
@@ -5760,7 +5795,7 @@
   <p:cSld>
     <p:spTree>
       <p:nvGrpSpPr>
-        <p:cNvPr id="98" name="Shape 98"/>
+        <p:cNvPr id="101" name="Shape 101"/>
         <p:cNvGrpSpPr/>
         <p:nvPr/>
       </p:nvGrpSpPr>
@@ -5774,7 +5809,7 @@
       </p:grpSpPr>
       <p:sp>
         <p:nvSpPr>
-          <p:cNvPr id="99" name="Shape 99"/>
+          <p:cNvPr id="102" name="Shape 102"/>
           <p:cNvSpPr txBox="1"/>
           <p:nvPr>
             <p:ph type="title"/>
@@ -5810,7 +5845,7 @@
       </p:sp>
       <p:pic>
         <p:nvPicPr>
-          <p:cNvPr descr="Main Screen.png" id="100" name="Shape 100"/>
+          <p:cNvPr descr="Main Screen.png" id="103" name="Shape 103"/>
           <p:cNvPicPr preferRelativeResize="0"/>
           <p:nvPr/>
         </p:nvPicPr>
@@ -5838,7 +5873,7 @@
       </p:pic>
       <p:pic>
         <p:nvPicPr>
-          <p:cNvPr descr="View Details.png" id="101" name="Shape 101"/>
+          <p:cNvPr descr="View Details.png" id="104" name="Shape 104"/>
           <p:cNvPicPr preferRelativeResize="0"/>
           <p:nvPr/>
         </p:nvPicPr>
@@ -5866,7 +5901,7 @@
       </p:pic>
       <p:pic>
         <p:nvPicPr>
-          <p:cNvPr descr="Edit Details.png" id="102" name="Shape 102"/>
+          <p:cNvPr descr="Edit Details.png" id="105" name="Shape 105"/>
           <p:cNvPicPr preferRelativeResize="0"/>
           <p:nvPr/>
         </p:nvPicPr>
@@ -5894,7 +5929,7 @@
       </p:pic>
       <p:pic>
         <p:nvPicPr>
-          <p:cNvPr descr="Add Item.png" id="103" name="Shape 103"/>
+          <p:cNvPr descr="Add Item.png" id="106" name="Shape 106"/>
           <p:cNvPicPr preferRelativeResize="0"/>
           <p:nvPr/>
         </p:nvPicPr>
@@ -5933,7 +5968,7 @@
   <p:cSld>
     <p:spTree>
       <p:nvGrpSpPr>
-        <p:cNvPr id="107" name="Shape 107"/>
+        <p:cNvPr id="110" name="Shape 110"/>
         <p:cNvGrpSpPr/>
         <p:nvPr/>
       </p:nvGrpSpPr>
@@ -5947,7 +5982,7 @@
       </p:grpSpPr>
       <p:sp>
         <p:nvSpPr>
-          <p:cNvPr id="108" name="Shape 108"/>
+          <p:cNvPr id="111" name="Shape 111"/>
           <p:cNvSpPr txBox="1"/>
           <p:nvPr>
             <p:ph type="title"/>
@@ -5983,7 +6018,7 @@
       </p:sp>
       <p:pic>
         <p:nvPicPr>
-          <p:cNvPr descr="Code Selection.png" id="109" name="Shape 109"/>
+          <p:cNvPr descr="Code Selection.png" id="112" name="Shape 112"/>
           <p:cNvPicPr preferRelativeResize="0"/>
           <p:nvPr/>
         </p:nvPicPr>
@@ -6018,6 +6053,285 @@
 </file>
 
 <file path=ppt/theme/theme1.xml><?xml version="1.0" encoding="utf-8"?>
+<a:theme xmlns:a="http://schemas.openxmlformats.org/drawingml/2006/main" xmlns:r="http://schemas.openxmlformats.org/officeDocument/2006/relationships" name="slate">
+  <a:themeElements>
+    <a:clrScheme name="Slate">
+      <a:dk1>
+        <a:srgbClr val="FFFFFF"/>
+      </a:dk1>
+      <a:lt1>
+        <a:srgbClr val="37474F"/>
+      </a:lt1>
+      <a:dk2>
+        <a:srgbClr val="9E9E9E"/>
+      </a:dk2>
+      <a:lt2>
+        <a:srgbClr val="E0E0E0"/>
+      </a:lt2>
+      <a:accent1>
+        <a:srgbClr val="616161"/>
+      </a:accent1>
+      <a:accent2>
+        <a:srgbClr val="78909C"/>
+      </a:accent2>
+      <a:accent3>
+        <a:srgbClr val="CACACA"/>
+      </a:accent3>
+      <a:accent4>
+        <a:srgbClr val="64FFDA"/>
+      </a:accent4>
+      <a:accent5>
+        <a:srgbClr val="FFD966"/>
+      </a:accent5>
+      <a:accent6>
+        <a:srgbClr val="F5F5F5"/>
+      </a:accent6>
+      <a:hlink>
+        <a:srgbClr val="FFD966"/>
+      </a:hlink>
+      <a:folHlink>
+        <a:srgbClr val="FFD966"/>
+      </a:folHlink>
+    </a:clrScheme>
+    <a:fontScheme name="Office">
+      <a:majorFont>
+        <a:latin typeface="Arial"/>
+        <a:ea typeface=""/>
+        <a:cs typeface=""/>
+        <a:font script="Jpan" typeface="ＭＳ Ｐゴシック"/>
+        <a:font script="Hang" typeface="맑은 고딕"/>
+        <a:font script="Hans" typeface="宋体"/>
+        <a:font script="Hant" typeface="新細明體"/>
+        <a:font script="Arab" typeface="Times New Roman"/>
+        <a:font script="Hebr" typeface="Times New Roman"/>
+        <a:font script="Thai" typeface="Angsana New"/>
+        <a:font script="Ethi" typeface="Nyala"/>
+        <a:font script="Beng" typeface="Vrinda"/>
+        <a:font script="Gujr" typeface="Shruti"/>
+        <a:font script="Khmr" typeface="MoolBoran"/>
+        <a:font script="Knda" typeface="Tunga"/>
+        <a:font script="Guru" typeface="Raavi"/>
+        <a:font script="Cans" typeface="Euphemia"/>
+        <a:font script="Cher" typeface="Plantagenet Cherokee"/>
+        <a:font script="Yiii" typeface="Microsoft Yi Baiti"/>
+        <a:font script="Tibt" typeface="Microsoft Himalaya"/>
+        <a:font script="Thaa" typeface="MV Boli"/>
+        <a:font script="Deva" typeface="Mangal"/>
+        <a:font script="Telu" typeface="Gautami"/>
+        <a:font script="Taml" typeface="Latha"/>
+        <a:font script="Syrc" typeface="Estrangelo Edessa"/>
+        <a:font script="Orya" typeface="Kalinga"/>
+        <a:font script="Mlym" typeface="Kartika"/>
+        <a:font script="Laoo" typeface="DokChampa"/>
+        <a:font script="Sinh" typeface="Iskoola Pota"/>
+        <a:font script="Mong" typeface="Mongolian Baiti"/>
+        <a:font script="Viet" typeface="Times New Roman"/>
+        <a:font script="Uigh" typeface="Microsoft Uighur"/>
+        <a:font script="Geor" typeface="Sylfaen"/>
+      </a:majorFont>
+      <a:minorFont>
+        <a:latin typeface="Arial"/>
+        <a:ea typeface=""/>
+        <a:cs typeface=""/>
+        <a:font script="Jpan" typeface="ＭＳ Ｐゴシック"/>
+        <a:font script="Hang" typeface="맑은 고딕"/>
+        <a:font script="Hans" typeface="宋体"/>
+        <a:font script="Hant" typeface="新細明體"/>
+        <a:font script="Arab" typeface="Arial"/>
+        <a:font script="Hebr" typeface="Arial"/>
+        <a:font script="Thai" typeface="Cordia New"/>
+        <a:font script="Ethi" typeface="Nyala"/>
+        <a:font script="Beng" typeface="Vrinda"/>
+        <a:font script="Gujr" typeface="Shruti"/>
+        <a:font script="Khmr" typeface="DaunPenh"/>
+        <a:font script="Knda" typeface="Tunga"/>
+        <a:font script="Guru" typeface="Raavi"/>
+        <a:font script="Cans" typeface="Euphemia"/>
+        <a:font script="Cher" typeface="Plantagenet Cherokee"/>
+        <a:font script="Yiii" typeface="Microsoft Yi Baiti"/>
+        <a:font script="Tibt" typeface="Microsoft Himalaya"/>
+        <a:font script="Thaa" typeface="MV Boli"/>
+        <a:font script="Deva" typeface="Mangal"/>
+        <a:font script="Telu" typeface="Gautami"/>
+        <a:font script="Taml" typeface="Latha"/>
+        <a:font script="Syrc" typeface="Estrangelo Edessa"/>
+        <a:font script="Orya" typeface="Kalinga"/>
+        <a:font script="Mlym" typeface="Kartika"/>
+        <a:font script="Laoo" typeface="DokChampa"/>
+        <a:font script="Sinh" typeface="Iskoola Pota"/>
+        <a:font script="Mong" typeface="Mongolian Baiti"/>
+        <a:font script="Viet" typeface="Arial"/>
+        <a:font script="Uigh" typeface="Microsoft Uighur"/>
+        <a:font script="Geor" typeface="Sylfaen"/>
+      </a:minorFont>
+    </a:fontScheme>
+    <a:fmtScheme name="Office">
+      <a:fillStyleLst>
+        <a:solidFill>
+          <a:schemeClr val="phClr"/>
+        </a:solidFill>
+        <a:gradFill rotWithShape="1">
+          <a:gsLst>
+            <a:gs pos="0">
+              <a:schemeClr val="phClr">
+                <a:tint val="50000"/>
+                <a:satMod val="300000"/>
+              </a:schemeClr>
+            </a:gs>
+            <a:gs pos="35000">
+              <a:schemeClr val="phClr">
+                <a:tint val="37000"/>
+                <a:satMod val="300000"/>
+              </a:schemeClr>
+            </a:gs>
+            <a:gs pos="100000">
+              <a:schemeClr val="phClr">
+                <a:tint val="15000"/>
+                <a:satMod val="350000"/>
+              </a:schemeClr>
+            </a:gs>
+          </a:gsLst>
+          <a:lin ang="16200000" scaled="1"/>
+        </a:gradFill>
+        <a:gradFill rotWithShape="1">
+          <a:gsLst>
+            <a:gs pos="0">
+              <a:schemeClr val="phClr">
+                <a:tint val="100000"/>
+                <a:shade val="100000"/>
+                <a:satMod val="130000"/>
+              </a:schemeClr>
+            </a:gs>
+            <a:gs pos="100000">
+              <a:schemeClr val="phClr">
+                <a:tint val="50000"/>
+                <a:shade val="100000"/>
+                <a:satMod val="350000"/>
+              </a:schemeClr>
+            </a:gs>
+          </a:gsLst>
+          <a:lin ang="16200000" scaled="0"/>
+        </a:gradFill>
+      </a:fillStyleLst>
+      <a:lnStyleLst>
+        <a:ln w="9525" cap="flat" cmpd="sng" algn="ctr">
+          <a:solidFill>
+            <a:schemeClr val="phClr">
+              <a:shade val="95000"/>
+              <a:satMod val="105000"/>
+            </a:schemeClr>
+          </a:solidFill>
+          <a:prstDash val="solid"/>
+        </a:ln>
+        <a:ln w="25400" cap="flat" cmpd="sng" algn="ctr">
+          <a:solidFill>
+            <a:schemeClr val="phClr"/>
+          </a:solidFill>
+          <a:prstDash val="solid"/>
+        </a:ln>
+        <a:ln w="38100" cap="flat" cmpd="sng" algn="ctr">
+          <a:solidFill>
+            <a:schemeClr val="phClr"/>
+          </a:solidFill>
+          <a:prstDash val="solid"/>
+        </a:ln>
+      </a:lnStyleLst>
+      <a:effectStyleLst>
+        <a:effectStyle>
+          <a:effectLst>
+            <a:outerShdw blurRad="40000" dist="20000" dir="5400000" rotWithShape="0">
+              <a:srgbClr val="000000">
+                <a:alpha val="38000"/>
+              </a:srgbClr>
+            </a:outerShdw>
+          </a:effectLst>
+        </a:effectStyle>
+        <a:effectStyle>
+          <a:effectLst>
+            <a:outerShdw blurRad="40000" dist="23000" dir="5400000" rotWithShape="0">
+              <a:srgbClr val="000000">
+                <a:alpha val="35000"/>
+              </a:srgbClr>
+            </a:outerShdw>
+          </a:effectLst>
+        </a:effectStyle>
+        <a:effectStyle>
+          <a:effectLst>
+            <a:outerShdw blurRad="40000" dist="23000" dir="5400000" rotWithShape="0">
+              <a:srgbClr val="000000">
+                <a:alpha val="35000"/>
+              </a:srgbClr>
+            </a:outerShdw>
+          </a:effectLst>
+          <a:scene3d>
+            <a:camera prst="orthographicFront">
+              <a:rot lat="0" lon="0" rev="0"/>
+            </a:camera>
+            <a:lightRig rig="threePt" dir="t">
+              <a:rot lat="0" lon="0" rev="1200000"/>
+            </a:lightRig>
+          </a:scene3d>
+          <a:sp3d>
+            <a:bevelT w="63500" h="25400"/>
+          </a:sp3d>
+        </a:effectStyle>
+      </a:effectStyleLst>
+      <a:bgFillStyleLst>
+        <a:solidFill>
+          <a:schemeClr val="phClr"/>
+        </a:solidFill>
+        <a:gradFill rotWithShape="1">
+          <a:gsLst>
+            <a:gs pos="0">
+              <a:schemeClr val="phClr">
+                <a:tint val="40000"/>
+                <a:satMod val="350000"/>
+              </a:schemeClr>
+            </a:gs>
+            <a:gs pos="40000">
+              <a:schemeClr val="phClr">
+                <a:tint val="45000"/>
+                <a:shade val="99000"/>
+                <a:satMod val="350000"/>
+              </a:schemeClr>
+            </a:gs>
+            <a:gs pos="100000">
+              <a:schemeClr val="phClr">
+                <a:shade val="20000"/>
+                <a:satMod val="255000"/>
+              </a:schemeClr>
+            </a:gs>
+          </a:gsLst>
+          <a:path path="circle">
+            <a:fillToRect l="50000" t="-80000" r="50000" b="180000"/>
+          </a:path>
+        </a:gradFill>
+        <a:gradFill rotWithShape="1">
+          <a:gsLst>
+            <a:gs pos="0">
+              <a:schemeClr val="phClr">
+                <a:tint val="80000"/>
+                <a:satMod val="300000"/>
+              </a:schemeClr>
+            </a:gs>
+            <a:gs pos="100000">
+              <a:schemeClr val="phClr">
+                <a:shade val="30000"/>
+                <a:satMod val="200000"/>
+              </a:schemeClr>
+            </a:gs>
+          </a:gsLst>
+          <a:path path="circle">
+            <a:fillToRect l="50000" t="50000" r="50000" b="50000"/>
+          </a:path>
+        </a:gradFill>
+      </a:bgFillStyleLst>
+    </a:fmtScheme>
+  </a:themeElements>
+</a:theme>
+</file>
+
+<file path=ppt/theme/theme2.xml><?xml version="1.0" encoding="utf-8"?>
 <a:theme xmlns:a="http://schemas.openxmlformats.org/drawingml/2006/main" xmlns:r="http://schemas.openxmlformats.org/officeDocument/2006/relationships" name="Custom Theme">
   <a:themeElements>
     <a:clrScheme name="Default">
@@ -6294,283 +6608,4 @@
     </a:fmtScheme>
   </a:themeElements>
 </a:theme>
-</file>
-
-<file path=ppt/theme/theme2.xml><?xml version="1.0" encoding="utf-8"?>
-<a:theme xmlns:a="http://schemas.openxmlformats.org/drawingml/2006/main" xmlns:r="http://schemas.openxmlformats.org/officeDocument/2006/relationships" name="gameday">
-  <a:themeElements>
-    <a:clrScheme name="Gameday">
-      <a:dk1>
-        <a:srgbClr val="4285F4"/>
-      </a:dk1>
-      <a:lt1>
-        <a:srgbClr val="FFFFFF"/>
-      </a:lt1>
-      <a:dk2>
-        <a:srgbClr val="666666"/>
-      </a:dk2>
-      <a:lt2>
-        <a:srgbClr val="D9D9D9"/>
-      </a:lt2>
-      <a:accent1>
-        <a:srgbClr val="455A64"/>
-      </a:accent1>
-      <a:accent2>
-        <a:srgbClr val="607D8B"/>
-      </a:accent2>
-      <a:accent3>
-        <a:srgbClr val="FF5722"/>
-      </a:accent3>
-      <a:accent4>
-        <a:srgbClr val="D84315"/>
-      </a:accent4>
-      <a:accent5>
-        <a:srgbClr val="1C3AA9"/>
-      </a:accent5>
-      <a:accent6>
-        <a:srgbClr val="FFAB40"/>
-      </a:accent6>
-      <a:hlink>
-        <a:srgbClr val="1C3AA9"/>
-      </a:hlink>
-      <a:folHlink>
-        <a:srgbClr val="1C3AA9"/>
-      </a:folHlink>
-    </a:clrScheme>
-    <a:fontScheme name="Office">
-      <a:majorFont>
-        <a:latin typeface="Arial"/>
-        <a:ea typeface=""/>
-        <a:cs typeface=""/>
-        <a:font script="Jpan" typeface="ＭＳ Ｐゴシック"/>
-        <a:font script="Hang" typeface="맑은 고딕"/>
-        <a:font script="Hans" typeface="宋体"/>
-        <a:font script="Hant" typeface="新細明體"/>
-        <a:font script="Arab" typeface="Times New Roman"/>
-        <a:font script="Hebr" typeface="Times New Roman"/>
-        <a:font script="Thai" typeface="Angsana New"/>
-        <a:font script="Ethi" typeface="Nyala"/>
-        <a:font script="Beng" typeface="Vrinda"/>
-        <a:font script="Gujr" typeface="Shruti"/>
-        <a:font script="Khmr" typeface="MoolBoran"/>
-        <a:font script="Knda" typeface="Tunga"/>
-        <a:font script="Guru" typeface="Raavi"/>
-        <a:font script="Cans" typeface="Euphemia"/>
-        <a:font script="Cher" typeface="Plantagenet Cherokee"/>
-        <a:font script="Yiii" typeface="Microsoft Yi Baiti"/>
-        <a:font script="Tibt" typeface="Microsoft Himalaya"/>
-        <a:font script="Thaa" typeface="MV Boli"/>
-        <a:font script="Deva" typeface="Mangal"/>
-        <a:font script="Telu" typeface="Gautami"/>
-        <a:font script="Taml" typeface="Latha"/>
-        <a:font script="Syrc" typeface="Estrangelo Edessa"/>
-        <a:font script="Orya" typeface="Kalinga"/>
-        <a:font script="Mlym" typeface="Kartika"/>
-        <a:font script="Laoo" typeface="DokChampa"/>
-        <a:font script="Sinh" typeface="Iskoola Pota"/>
-        <a:font script="Mong" typeface="Mongolian Baiti"/>
-        <a:font script="Viet" typeface="Times New Roman"/>
-        <a:font script="Uigh" typeface="Microsoft Uighur"/>
-        <a:font script="Geor" typeface="Sylfaen"/>
-      </a:majorFont>
-      <a:minorFont>
-        <a:latin typeface="Arial"/>
-        <a:ea typeface=""/>
-        <a:cs typeface=""/>
-        <a:font script="Jpan" typeface="ＭＳ Ｐゴシック"/>
-        <a:font script="Hang" typeface="맑은 고딕"/>
-        <a:font script="Hans" typeface="宋体"/>
-        <a:font script="Hant" typeface="新細明體"/>
-        <a:font script="Arab" typeface="Arial"/>
-        <a:font script="Hebr" typeface="Arial"/>
-        <a:font script="Thai" typeface="Cordia New"/>
-        <a:font script="Ethi" typeface="Nyala"/>
-        <a:font script="Beng" typeface="Vrinda"/>
-        <a:font script="Gujr" typeface="Shruti"/>
-        <a:font script="Khmr" typeface="DaunPenh"/>
-        <a:font script="Knda" typeface="Tunga"/>
-        <a:font script="Guru" typeface="Raavi"/>
-        <a:font script="Cans" typeface="Euphemia"/>
-        <a:font script="Cher" typeface="Plantagenet Cherokee"/>
-        <a:font script="Yiii" typeface="Microsoft Yi Baiti"/>
-        <a:font script="Tibt" typeface="Microsoft Himalaya"/>
-        <a:font script="Thaa" typeface="MV Boli"/>
-        <a:font script="Deva" typeface="Mangal"/>
-        <a:font script="Telu" typeface="Gautami"/>
-        <a:font script="Taml" typeface="Latha"/>
-        <a:font script="Syrc" typeface="Estrangelo Edessa"/>
-        <a:font script="Orya" typeface="Kalinga"/>
-        <a:font script="Mlym" typeface="Kartika"/>
-        <a:font script="Laoo" typeface="DokChampa"/>
-        <a:font script="Sinh" typeface="Iskoola Pota"/>
-        <a:font script="Mong" typeface="Mongolian Baiti"/>
-        <a:font script="Viet" typeface="Arial"/>
-        <a:font script="Uigh" typeface="Microsoft Uighur"/>
-        <a:font script="Geor" typeface="Sylfaen"/>
-      </a:minorFont>
-    </a:fontScheme>
-    <a:fmtScheme name="Office">
-      <a:fillStyleLst>
-        <a:solidFill>
-          <a:schemeClr val="phClr"/>
-        </a:solidFill>
-        <a:gradFill rotWithShape="1">
-          <a:gsLst>
-            <a:gs pos="0">
-              <a:schemeClr val="phClr">
-                <a:tint val="50000"/>
-                <a:satMod val="300000"/>
-              </a:schemeClr>
-            </a:gs>
-            <a:gs pos="35000">
-              <a:schemeClr val="phClr">
-                <a:tint val="37000"/>
-                <a:satMod val="300000"/>
-              </a:schemeClr>
-            </a:gs>
-            <a:gs pos="100000">
-              <a:schemeClr val="phClr">
-                <a:tint val="15000"/>
-                <a:satMod val="350000"/>
-              </a:schemeClr>
-            </a:gs>
-          </a:gsLst>
-          <a:lin ang="16200000" scaled="1"/>
-        </a:gradFill>
-        <a:gradFill rotWithShape="1">
-          <a:gsLst>
-            <a:gs pos="0">
-              <a:schemeClr val="phClr">
-                <a:tint val="100000"/>
-                <a:shade val="100000"/>
-                <a:satMod val="130000"/>
-              </a:schemeClr>
-            </a:gs>
-            <a:gs pos="100000">
-              <a:schemeClr val="phClr">
-                <a:tint val="50000"/>
-                <a:shade val="100000"/>
-                <a:satMod val="350000"/>
-              </a:schemeClr>
-            </a:gs>
-          </a:gsLst>
-          <a:lin ang="16200000" scaled="0"/>
-        </a:gradFill>
-      </a:fillStyleLst>
-      <a:lnStyleLst>
-        <a:ln w="9525" cap="flat" cmpd="sng" algn="ctr">
-          <a:solidFill>
-            <a:schemeClr val="phClr">
-              <a:shade val="95000"/>
-              <a:satMod val="105000"/>
-            </a:schemeClr>
-          </a:solidFill>
-          <a:prstDash val="solid"/>
-        </a:ln>
-        <a:ln w="25400" cap="flat" cmpd="sng" algn="ctr">
-          <a:solidFill>
-            <a:schemeClr val="phClr"/>
-          </a:solidFill>
-          <a:prstDash val="solid"/>
-        </a:ln>
-        <a:ln w="38100" cap="flat" cmpd="sng" algn="ctr">
-          <a:solidFill>
-            <a:schemeClr val="phClr"/>
-          </a:solidFill>
-          <a:prstDash val="solid"/>
-        </a:ln>
-      </a:lnStyleLst>
-      <a:effectStyleLst>
-        <a:effectStyle>
-          <a:effectLst>
-            <a:outerShdw blurRad="40000" dist="20000" dir="5400000" rotWithShape="0">
-              <a:srgbClr val="000000">
-                <a:alpha val="38000"/>
-              </a:srgbClr>
-            </a:outerShdw>
-          </a:effectLst>
-        </a:effectStyle>
-        <a:effectStyle>
-          <a:effectLst>
-            <a:outerShdw blurRad="40000" dist="23000" dir="5400000" rotWithShape="0">
-              <a:srgbClr val="000000">
-                <a:alpha val="35000"/>
-              </a:srgbClr>
-            </a:outerShdw>
-          </a:effectLst>
-        </a:effectStyle>
-        <a:effectStyle>
-          <a:effectLst>
-            <a:outerShdw blurRad="40000" dist="23000" dir="5400000" rotWithShape="0">
-              <a:srgbClr val="000000">
-                <a:alpha val="35000"/>
-              </a:srgbClr>
-            </a:outerShdw>
-          </a:effectLst>
-          <a:scene3d>
-            <a:camera prst="orthographicFront">
-              <a:rot lat="0" lon="0" rev="0"/>
-            </a:camera>
-            <a:lightRig rig="threePt" dir="t">
-              <a:rot lat="0" lon="0" rev="1200000"/>
-            </a:lightRig>
-          </a:scene3d>
-          <a:sp3d>
-            <a:bevelT w="63500" h="25400"/>
-          </a:sp3d>
-        </a:effectStyle>
-      </a:effectStyleLst>
-      <a:bgFillStyleLst>
-        <a:solidFill>
-          <a:schemeClr val="phClr"/>
-        </a:solidFill>
-        <a:gradFill rotWithShape="1">
-          <a:gsLst>
-            <a:gs pos="0">
-              <a:schemeClr val="phClr">
-                <a:tint val="40000"/>
-                <a:satMod val="350000"/>
-              </a:schemeClr>
-            </a:gs>
-            <a:gs pos="40000">
-              <a:schemeClr val="phClr">
-                <a:tint val="45000"/>
-                <a:shade val="99000"/>
-                <a:satMod val="350000"/>
-              </a:schemeClr>
-            </a:gs>
-            <a:gs pos="100000">
-              <a:schemeClr val="phClr">
-                <a:shade val="20000"/>
-                <a:satMod val="255000"/>
-              </a:schemeClr>
-            </a:gs>
-          </a:gsLst>
-          <a:path path="circle">
-            <a:fillToRect l="50000" t="-80000" r="50000" b="180000"/>
-          </a:path>
-        </a:gradFill>
-        <a:gradFill rotWithShape="1">
-          <a:gsLst>
-            <a:gs pos="0">
-              <a:schemeClr val="phClr">
-                <a:tint val="80000"/>
-                <a:satMod val="300000"/>
-              </a:schemeClr>
-            </a:gs>
-            <a:gs pos="100000">
-              <a:schemeClr val="phClr">
-                <a:shade val="30000"/>
-                <a:satMod val="200000"/>
-              </a:schemeClr>
-            </a:gs>
-          </a:gsLst>
-          <a:path path="circle">
-            <a:fillToRect l="50000" t="50000" r="50000" b="50000"/>
-          </a:path>
-        </a:gradFill>
-      </a:bgFillStyleLst>
-    </a:fmtScheme>
-  </a:themeElements>
-</a:theme>
 </file>
</xml_diff>